<commit_message>
Documentation: consolidated installation instructions. (#40)
</commit_message>
<xml_diff>
--- a/talks/repositories.pptx
+++ b/talks/repositories.pptx
@@ -254,7 +254,7 @@
           <a:p>
             <a:fld id="{0DC86ED9-B0FC-4166-96FE-019390E55704}" type="datetimeFigureOut">
               <a:rPr lang="en-US" smtClean="0"/>
-              <a:t>9/11/2019</a:t>
+              <a:t>9/16/2019</a:t>
             </a:fld>
             <a:endParaRPr lang="en-US"/>
           </a:p>
@@ -424,7 +424,7 @@
           <a:p>
             <a:fld id="{0DC86ED9-B0FC-4166-96FE-019390E55704}" type="datetimeFigureOut">
               <a:rPr lang="en-US" smtClean="0"/>
-              <a:t>9/11/2019</a:t>
+              <a:t>9/16/2019</a:t>
             </a:fld>
             <a:endParaRPr lang="en-US"/>
           </a:p>
@@ -604,7 +604,7 @@
           <a:p>
             <a:fld id="{0DC86ED9-B0FC-4166-96FE-019390E55704}" type="datetimeFigureOut">
               <a:rPr lang="en-US" smtClean="0"/>
-              <a:t>9/11/2019</a:t>
+              <a:t>9/16/2019</a:t>
             </a:fld>
             <a:endParaRPr lang="en-US"/>
           </a:p>
@@ -774,7 +774,7 @@
           <a:p>
             <a:fld id="{0DC86ED9-B0FC-4166-96FE-019390E55704}" type="datetimeFigureOut">
               <a:rPr lang="en-US" smtClean="0"/>
-              <a:t>9/11/2019</a:t>
+              <a:t>9/16/2019</a:t>
             </a:fld>
             <a:endParaRPr lang="en-US"/>
           </a:p>
@@ -1018,7 +1018,7 @@
           <a:p>
             <a:fld id="{0DC86ED9-B0FC-4166-96FE-019390E55704}" type="datetimeFigureOut">
               <a:rPr lang="en-US" smtClean="0"/>
-              <a:t>9/11/2019</a:t>
+              <a:t>9/16/2019</a:t>
             </a:fld>
             <a:endParaRPr lang="en-US"/>
           </a:p>
@@ -1250,7 +1250,7 @@
           <a:p>
             <a:fld id="{0DC86ED9-B0FC-4166-96FE-019390E55704}" type="datetimeFigureOut">
               <a:rPr lang="en-US" smtClean="0"/>
-              <a:t>9/11/2019</a:t>
+              <a:t>9/16/2019</a:t>
             </a:fld>
             <a:endParaRPr lang="en-US"/>
           </a:p>
@@ -1617,7 +1617,7 @@
           <a:p>
             <a:fld id="{0DC86ED9-B0FC-4166-96FE-019390E55704}" type="datetimeFigureOut">
               <a:rPr lang="en-US" smtClean="0"/>
-              <a:t>9/11/2019</a:t>
+              <a:t>9/16/2019</a:t>
             </a:fld>
             <a:endParaRPr lang="en-US"/>
           </a:p>
@@ -1735,7 +1735,7 @@
           <a:p>
             <a:fld id="{0DC86ED9-B0FC-4166-96FE-019390E55704}" type="datetimeFigureOut">
               <a:rPr lang="en-US" smtClean="0"/>
-              <a:t>9/11/2019</a:t>
+              <a:t>9/16/2019</a:t>
             </a:fld>
             <a:endParaRPr lang="en-US"/>
           </a:p>
@@ -1830,7 +1830,7 @@
           <a:p>
             <a:fld id="{0DC86ED9-B0FC-4166-96FE-019390E55704}" type="datetimeFigureOut">
               <a:rPr lang="en-US" smtClean="0"/>
-              <a:t>9/11/2019</a:t>
+              <a:t>9/16/2019</a:t>
             </a:fld>
             <a:endParaRPr lang="en-US"/>
           </a:p>
@@ -2107,7 +2107,7 @@
           <a:p>
             <a:fld id="{0DC86ED9-B0FC-4166-96FE-019390E55704}" type="datetimeFigureOut">
               <a:rPr lang="en-US" smtClean="0"/>
-              <a:t>9/11/2019</a:t>
+              <a:t>9/16/2019</a:t>
             </a:fld>
             <a:endParaRPr lang="en-US"/>
           </a:p>
@@ -2364,7 +2364,7 @@
           <a:p>
             <a:fld id="{0DC86ED9-B0FC-4166-96FE-019390E55704}" type="datetimeFigureOut">
               <a:rPr lang="en-US" smtClean="0"/>
-              <a:t>9/11/2019</a:t>
+              <a:t>9/16/2019</a:t>
             </a:fld>
             <a:endParaRPr lang="en-US"/>
           </a:p>
@@ -2577,7 +2577,7 @@
           <a:p>
             <a:fld id="{0DC86ED9-B0FC-4166-96FE-019390E55704}" type="datetimeFigureOut">
               <a:rPr lang="en-US" smtClean="0"/>
-              <a:t>9/11/2019</a:t>
+              <a:t>9/16/2019</a:t>
             </a:fld>
             <a:endParaRPr lang="en-US"/>
           </a:p>
@@ -5078,8 +5078,8 @@
         </p:nvSpPr>
         <p:spPr>
           <a:xfrm>
-            <a:off x="4562746" y="2574292"/>
-            <a:ext cx="1415772" cy="1046440"/>
+            <a:off x="4562746" y="2482199"/>
+            <a:ext cx="1415772" cy="1169551"/>
           </a:xfrm>
           <a:prstGeom prst="rect">
             <a:avLst/>
@@ -5157,6 +5157,20 @@
                 <a:latin typeface="Arial" panose="020B0604020202020204" pitchFamily="34" charset="0"/>
               </a:rPr>
               <a:t>message</a:t>
+            </a:r>
+          </a:p>
+          <a:p>
+            <a:r>
+              <a:rPr lang="en-US" sz="800">
+                <a:latin typeface="Arial" panose="020B0604020202020204" pitchFamily="34" charset="0"/>
+              </a:rPr>
+              <a:t>git push origin </a:t>
+            </a:r>
+            <a:r>
+              <a:rPr lang="en-US" sz="800" i="1">
+                <a:latin typeface="Arial" panose="020B0604020202020204" pitchFamily="34" charset="0"/>
+              </a:rPr>
+              <a:t>feature</a:t>
             </a:r>
           </a:p>
         </p:txBody>

</xml_diff>

<commit_message>
Updated repositories picture to reflect move to PyPI.
</commit_message>
<xml_diff>
--- a/talks/repositories.pptx
+++ b/talks/repositories.pptx
@@ -254,7 +254,7 @@
           <a:p>
             <a:fld id="{0DC86ED9-B0FC-4166-96FE-019390E55704}" type="datetimeFigureOut">
               <a:rPr lang="en-US" smtClean="0"/>
-              <a:t>9/16/2019</a:t>
+              <a:t>10/3/2019</a:t>
             </a:fld>
             <a:endParaRPr lang="en-US"/>
           </a:p>
@@ -424,7 +424,7 @@
           <a:p>
             <a:fld id="{0DC86ED9-B0FC-4166-96FE-019390E55704}" type="datetimeFigureOut">
               <a:rPr lang="en-US" smtClean="0"/>
-              <a:t>9/16/2019</a:t>
+              <a:t>10/3/2019</a:t>
             </a:fld>
             <a:endParaRPr lang="en-US"/>
           </a:p>
@@ -604,7 +604,7 @@
           <a:p>
             <a:fld id="{0DC86ED9-B0FC-4166-96FE-019390E55704}" type="datetimeFigureOut">
               <a:rPr lang="en-US" smtClean="0"/>
-              <a:t>9/16/2019</a:t>
+              <a:t>10/3/2019</a:t>
             </a:fld>
             <a:endParaRPr lang="en-US"/>
           </a:p>
@@ -774,7 +774,7 @@
           <a:p>
             <a:fld id="{0DC86ED9-B0FC-4166-96FE-019390E55704}" type="datetimeFigureOut">
               <a:rPr lang="en-US" smtClean="0"/>
-              <a:t>9/16/2019</a:t>
+              <a:t>10/3/2019</a:t>
             </a:fld>
             <a:endParaRPr lang="en-US"/>
           </a:p>
@@ -1018,7 +1018,7 @@
           <a:p>
             <a:fld id="{0DC86ED9-B0FC-4166-96FE-019390E55704}" type="datetimeFigureOut">
               <a:rPr lang="en-US" smtClean="0"/>
-              <a:t>9/16/2019</a:t>
+              <a:t>10/3/2019</a:t>
             </a:fld>
             <a:endParaRPr lang="en-US"/>
           </a:p>
@@ -1250,7 +1250,7 @@
           <a:p>
             <a:fld id="{0DC86ED9-B0FC-4166-96FE-019390E55704}" type="datetimeFigureOut">
               <a:rPr lang="en-US" smtClean="0"/>
-              <a:t>9/16/2019</a:t>
+              <a:t>10/3/2019</a:t>
             </a:fld>
             <a:endParaRPr lang="en-US"/>
           </a:p>
@@ -1617,7 +1617,7 @@
           <a:p>
             <a:fld id="{0DC86ED9-B0FC-4166-96FE-019390E55704}" type="datetimeFigureOut">
               <a:rPr lang="en-US" smtClean="0"/>
-              <a:t>9/16/2019</a:t>
+              <a:t>10/3/2019</a:t>
             </a:fld>
             <a:endParaRPr lang="en-US"/>
           </a:p>
@@ -1735,7 +1735,7 @@
           <a:p>
             <a:fld id="{0DC86ED9-B0FC-4166-96FE-019390E55704}" type="datetimeFigureOut">
               <a:rPr lang="en-US" smtClean="0"/>
-              <a:t>9/16/2019</a:t>
+              <a:t>10/3/2019</a:t>
             </a:fld>
             <a:endParaRPr lang="en-US"/>
           </a:p>
@@ -1830,7 +1830,7 @@
           <a:p>
             <a:fld id="{0DC86ED9-B0FC-4166-96FE-019390E55704}" type="datetimeFigureOut">
               <a:rPr lang="en-US" smtClean="0"/>
-              <a:t>9/16/2019</a:t>
+              <a:t>10/3/2019</a:t>
             </a:fld>
             <a:endParaRPr lang="en-US"/>
           </a:p>
@@ -2107,7 +2107,7 @@
           <a:p>
             <a:fld id="{0DC86ED9-B0FC-4166-96FE-019390E55704}" type="datetimeFigureOut">
               <a:rPr lang="en-US" smtClean="0"/>
-              <a:t>9/16/2019</a:t>
+              <a:t>10/3/2019</a:t>
             </a:fld>
             <a:endParaRPr lang="en-US"/>
           </a:p>
@@ -2364,7 +2364,7 @@
           <a:p>
             <a:fld id="{0DC86ED9-B0FC-4166-96FE-019390E55704}" type="datetimeFigureOut">
               <a:rPr lang="en-US" smtClean="0"/>
-              <a:t>9/16/2019</a:t>
+              <a:t>10/3/2019</a:t>
             </a:fld>
             <a:endParaRPr lang="en-US"/>
           </a:p>
@@ -2577,7 +2577,7 @@
           <a:p>
             <a:fld id="{0DC86ED9-B0FC-4166-96FE-019390E55704}" type="datetimeFigureOut">
               <a:rPr lang="en-US" smtClean="0"/>
-              <a:t>9/16/2019</a:t>
+              <a:t>10/3/2019</a:t>
             </a:fld>
             <a:endParaRPr lang="en-US"/>
           </a:p>
@@ -3888,7 +3888,24 @@
           <a:p>
             <a:pPr algn="ctr"/>
             <a:r>
-              <a:rPr lang="en-US" sz="1600">
+              <a:rPr lang="en-US" sz="900">
+                <a:solidFill>
+                  <a:schemeClr val="tx1"/>
+                </a:solidFill>
+                <a:latin typeface="Arial" panose="020B0604020202020204" pitchFamily="34" charset="0"/>
+              </a:rPr>
+              <a:t>optional:</a:t>
+            </a:r>
+            <a:br>
+              <a:rPr lang="en-US" sz="900">
+                <a:solidFill>
+                  <a:schemeClr val="tx1"/>
+                </a:solidFill>
+                <a:latin typeface="Arial" panose="020B0604020202020204" pitchFamily="34" charset="0"/>
+              </a:rPr>
+            </a:br>
+            <a:r>
+              <a:rPr lang="en-US" sz="900">
                 <a:solidFill>
                   <a:schemeClr val="tx1"/>
                 </a:solidFill>
@@ -4512,7 +4529,7 @@
         <p:spPr>
           <a:xfrm>
             <a:off x="3398243" y="1003491"/>
-            <a:ext cx="2379177" cy="553998"/>
+            <a:ext cx="1489510" cy="553998"/>
           </a:xfrm>
           <a:prstGeom prst="rect">
             <a:avLst/>
@@ -4537,7 +4554,7 @@
               <a:rPr lang="en-US" sz="800">
                 <a:latin typeface="Arial" panose="020B0604020202020204" pitchFamily="34" charset="0"/>
               </a:rPr>
-              <a:t>pip install git+https://git@github.com/IBM/lale.git</a:t>
+              <a:t>pip install lale</a:t>
             </a:r>
           </a:p>
           <a:p>
@@ -5233,7 +5250,7 @@
         <p:spPr>
           <a:xfrm>
             <a:off x="1980507" y="3787719"/>
-            <a:ext cx="1385316" cy="800219"/>
+            <a:ext cx="2056973" cy="923330"/>
           </a:xfrm>
           <a:prstGeom prst="rect">
             <a:avLst/>
@@ -5282,7 +5299,27 @@
               <a:rPr lang="en-US" sz="800">
                 <a:latin typeface="Arial" panose="020B0604020202020204" pitchFamily="34" charset="0"/>
               </a:rPr>
-              <a:t>[Optional: delete branch]</a:t>
+              <a:t>[Optional:] git branch –d </a:t>
+            </a:r>
+            <a:r>
+              <a:rPr lang="en-US" sz="800" i="1">
+                <a:latin typeface="Arial" panose="020B0604020202020204" pitchFamily="34" charset="0"/>
+              </a:rPr>
+              <a:t>feature</a:t>
+            </a:r>
+          </a:p>
+          <a:p>
+            <a:r>
+              <a:rPr lang="en-US" sz="800">
+                <a:latin typeface="Arial" panose="020B0604020202020204" pitchFamily="34" charset="0"/>
+              </a:rPr>
+              <a:t>[Optional:] git push --delete origin </a:t>
+            </a:r>
+            <a:r>
+              <a:rPr lang="en-US" sz="800" i="1">
+                <a:latin typeface="Arial" panose="020B0604020202020204" pitchFamily="34" charset="0"/>
+              </a:rPr>
+              <a:t>feature</a:t>
             </a:r>
           </a:p>
         </p:txBody>

</xml_diff>

<commit_message>
Updated repositories picture to reflect move to PyPI. (#52)
</commit_message>
<xml_diff>
--- a/talks/repositories.pptx
+++ b/talks/repositories.pptx
@@ -254,7 +254,7 @@
           <a:p>
             <a:fld id="{0DC86ED9-B0FC-4166-96FE-019390E55704}" type="datetimeFigureOut">
               <a:rPr lang="en-US" smtClean="0"/>
-              <a:t>9/16/2019</a:t>
+              <a:t>10/3/2019</a:t>
             </a:fld>
             <a:endParaRPr lang="en-US"/>
           </a:p>
@@ -424,7 +424,7 @@
           <a:p>
             <a:fld id="{0DC86ED9-B0FC-4166-96FE-019390E55704}" type="datetimeFigureOut">
               <a:rPr lang="en-US" smtClean="0"/>
-              <a:t>9/16/2019</a:t>
+              <a:t>10/3/2019</a:t>
             </a:fld>
             <a:endParaRPr lang="en-US"/>
           </a:p>
@@ -604,7 +604,7 @@
           <a:p>
             <a:fld id="{0DC86ED9-B0FC-4166-96FE-019390E55704}" type="datetimeFigureOut">
               <a:rPr lang="en-US" smtClean="0"/>
-              <a:t>9/16/2019</a:t>
+              <a:t>10/3/2019</a:t>
             </a:fld>
             <a:endParaRPr lang="en-US"/>
           </a:p>
@@ -774,7 +774,7 @@
           <a:p>
             <a:fld id="{0DC86ED9-B0FC-4166-96FE-019390E55704}" type="datetimeFigureOut">
               <a:rPr lang="en-US" smtClean="0"/>
-              <a:t>9/16/2019</a:t>
+              <a:t>10/3/2019</a:t>
             </a:fld>
             <a:endParaRPr lang="en-US"/>
           </a:p>
@@ -1018,7 +1018,7 @@
           <a:p>
             <a:fld id="{0DC86ED9-B0FC-4166-96FE-019390E55704}" type="datetimeFigureOut">
               <a:rPr lang="en-US" smtClean="0"/>
-              <a:t>9/16/2019</a:t>
+              <a:t>10/3/2019</a:t>
             </a:fld>
             <a:endParaRPr lang="en-US"/>
           </a:p>
@@ -1250,7 +1250,7 @@
           <a:p>
             <a:fld id="{0DC86ED9-B0FC-4166-96FE-019390E55704}" type="datetimeFigureOut">
               <a:rPr lang="en-US" smtClean="0"/>
-              <a:t>9/16/2019</a:t>
+              <a:t>10/3/2019</a:t>
             </a:fld>
             <a:endParaRPr lang="en-US"/>
           </a:p>
@@ -1617,7 +1617,7 @@
           <a:p>
             <a:fld id="{0DC86ED9-B0FC-4166-96FE-019390E55704}" type="datetimeFigureOut">
               <a:rPr lang="en-US" smtClean="0"/>
-              <a:t>9/16/2019</a:t>
+              <a:t>10/3/2019</a:t>
             </a:fld>
             <a:endParaRPr lang="en-US"/>
           </a:p>
@@ -1735,7 +1735,7 @@
           <a:p>
             <a:fld id="{0DC86ED9-B0FC-4166-96FE-019390E55704}" type="datetimeFigureOut">
               <a:rPr lang="en-US" smtClean="0"/>
-              <a:t>9/16/2019</a:t>
+              <a:t>10/3/2019</a:t>
             </a:fld>
             <a:endParaRPr lang="en-US"/>
           </a:p>
@@ -1830,7 +1830,7 @@
           <a:p>
             <a:fld id="{0DC86ED9-B0FC-4166-96FE-019390E55704}" type="datetimeFigureOut">
               <a:rPr lang="en-US" smtClean="0"/>
-              <a:t>9/16/2019</a:t>
+              <a:t>10/3/2019</a:t>
             </a:fld>
             <a:endParaRPr lang="en-US"/>
           </a:p>
@@ -2107,7 +2107,7 @@
           <a:p>
             <a:fld id="{0DC86ED9-B0FC-4166-96FE-019390E55704}" type="datetimeFigureOut">
               <a:rPr lang="en-US" smtClean="0"/>
-              <a:t>9/16/2019</a:t>
+              <a:t>10/3/2019</a:t>
             </a:fld>
             <a:endParaRPr lang="en-US"/>
           </a:p>
@@ -2364,7 +2364,7 @@
           <a:p>
             <a:fld id="{0DC86ED9-B0FC-4166-96FE-019390E55704}" type="datetimeFigureOut">
               <a:rPr lang="en-US" smtClean="0"/>
-              <a:t>9/16/2019</a:t>
+              <a:t>10/3/2019</a:t>
             </a:fld>
             <a:endParaRPr lang="en-US"/>
           </a:p>
@@ -2577,7 +2577,7 @@
           <a:p>
             <a:fld id="{0DC86ED9-B0FC-4166-96FE-019390E55704}" type="datetimeFigureOut">
               <a:rPr lang="en-US" smtClean="0"/>
-              <a:t>9/16/2019</a:t>
+              <a:t>10/3/2019</a:t>
             </a:fld>
             <a:endParaRPr lang="en-US"/>
           </a:p>
@@ -3888,7 +3888,24 @@
           <a:p>
             <a:pPr algn="ctr"/>
             <a:r>
-              <a:rPr lang="en-US" sz="1600">
+              <a:rPr lang="en-US" sz="900">
+                <a:solidFill>
+                  <a:schemeClr val="tx1"/>
+                </a:solidFill>
+                <a:latin typeface="Arial" panose="020B0604020202020204" pitchFamily="34" charset="0"/>
+              </a:rPr>
+              <a:t>optional:</a:t>
+            </a:r>
+            <a:br>
+              <a:rPr lang="en-US" sz="900">
+                <a:solidFill>
+                  <a:schemeClr val="tx1"/>
+                </a:solidFill>
+                <a:latin typeface="Arial" panose="020B0604020202020204" pitchFamily="34" charset="0"/>
+              </a:rPr>
+            </a:br>
+            <a:r>
+              <a:rPr lang="en-US" sz="900">
                 <a:solidFill>
                   <a:schemeClr val="tx1"/>
                 </a:solidFill>
@@ -4512,7 +4529,7 @@
         <p:spPr>
           <a:xfrm>
             <a:off x="3398243" y="1003491"/>
-            <a:ext cx="2379177" cy="553998"/>
+            <a:ext cx="1489510" cy="553998"/>
           </a:xfrm>
           <a:prstGeom prst="rect">
             <a:avLst/>
@@ -4537,7 +4554,7 @@
               <a:rPr lang="en-US" sz="800">
                 <a:latin typeface="Arial" panose="020B0604020202020204" pitchFamily="34" charset="0"/>
               </a:rPr>
-              <a:t>pip install git+https://git@github.com/IBM/lale.git</a:t>
+              <a:t>pip install lale</a:t>
             </a:r>
           </a:p>
           <a:p>
@@ -5233,7 +5250,7 @@
         <p:spPr>
           <a:xfrm>
             <a:off x="1980507" y="3787719"/>
-            <a:ext cx="1385316" cy="800219"/>
+            <a:ext cx="2056973" cy="923330"/>
           </a:xfrm>
           <a:prstGeom prst="rect">
             <a:avLst/>
@@ -5282,7 +5299,27 @@
               <a:rPr lang="en-US" sz="800">
                 <a:latin typeface="Arial" panose="020B0604020202020204" pitchFamily="34" charset="0"/>
               </a:rPr>
-              <a:t>[Optional: delete branch]</a:t>
+              <a:t>[Optional:] git branch –d </a:t>
+            </a:r>
+            <a:r>
+              <a:rPr lang="en-US" sz="800" i="1">
+                <a:latin typeface="Arial" panose="020B0604020202020204" pitchFamily="34" charset="0"/>
+              </a:rPr>
+              <a:t>feature</a:t>
+            </a:r>
+          </a:p>
+          <a:p>
+            <a:r>
+              <a:rPr lang="en-US" sz="800">
+                <a:latin typeface="Arial" panose="020B0604020202020204" pitchFamily="34" charset="0"/>
+              </a:rPr>
+              <a:t>[Optional:] git push --delete origin </a:t>
+            </a:r>
+            <a:r>
+              <a:rPr lang="en-US" sz="800" i="1">
+                <a:latin typeface="Arial" panose="020B0604020202020204" pitchFamily="34" charset="0"/>
+              </a:rPr>
+              <a:t>feature</a:t>
             </a:r>
           </a:p>
         </p:txBody>

</xml_diff>

<commit_message>
Changed repositories figure to mention github actions instead of travis.
</commit_message>
<xml_diff>
--- a/talks/repositories.pptx
+++ b/talks/repositories.pptx
@@ -254,7 +254,7 @@
           <a:p>
             <a:fld id="{0DC86ED9-B0FC-4166-96FE-019390E55704}" type="datetimeFigureOut">
               <a:rPr lang="en-US" smtClean="0"/>
-              <a:t>10/3/2019</a:t>
+              <a:t>11/12/2020</a:t>
             </a:fld>
             <a:endParaRPr lang="en-US"/>
           </a:p>
@@ -424,7 +424,7 @@
           <a:p>
             <a:fld id="{0DC86ED9-B0FC-4166-96FE-019390E55704}" type="datetimeFigureOut">
               <a:rPr lang="en-US" smtClean="0"/>
-              <a:t>10/3/2019</a:t>
+              <a:t>11/12/2020</a:t>
             </a:fld>
             <a:endParaRPr lang="en-US"/>
           </a:p>
@@ -604,7 +604,7 @@
           <a:p>
             <a:fld id="{0DC86ED9-B0FC-4166-96FE-019390E55704}" type="datetimeFigureOut">
               <a:rPr lang="en-US" smtClean="0"/>
-              <a:t>10/3/2019</a:t>
+              <a:t>11/12/2020</a:t>
             </a:fld>
             <a:endParaRPr lang="en-US"/>
           </a:p>
@@ -774,7 +774,7 @@
           <a:p>
             <a:fld id="{0DC86ED9-B0FC-4166-96FE-019390E55704}" type="datetimeFigureOut">
               <a:rPr lang="en-US" smtClean="0"/>
-              <a:t>10/3/2019</a:t>
+              <a:t>11/12/2020</a:t>
             </a:fld>
             <a:endParaRPr lang="en-US"/>
           </a:p>
@@ -1018,7 +1018,7 @@
           <a:p>
             <a:fld id="{0DC86ED9-B0FC-4166-96FE-019390E55704}" type="datetimeFigureOut">
               <a:rPr lang="en-US" smtClean="0"/>
-              <a:t>10/3/2019</a:t>
+              <a:t>11/12/2020</a:t>
             </a:fld>
             <a:endParaRPr lang="en-US"/>
           </a:p>
@@ -1250,7 +1250,7 @@
           <a:p>
             <a:fld id="{0DC86ED9-B0FC-4166-96FE-019390E55704}" type="datetimeFigureOut">
               <a:rPr lang="en-US" smtClean="0"/>
-              <a:t>10/3/2019</a:t>
+              <a:t>11/12/2020</a:t>
             </a:fld>
             <a:endParaRPr lang="en-US"/>
           </a:p>
@@ -1617,7 +1617,7 @@
           <a:p>
             <a:fld id="{0DC86ED9-B0FC-4166-96FE-019390E55704}" type="datetimeFigureOut">
               <a:rPr lang="en-US" smtClean="0"/>
-              <a:t>10/3/2019</a:t>
+              <a:t>11/12/2020</a:t>
             </a:fld>
             <a:endParaRPr lang="en-US"/>
           </a:p>
@@ -1735,7 +1735,7 @@
           <a:p>
             <a:fld id="{0DC86ED9-B0FC-4166-96FE-019390E55704}" type="datetimeFigureOut">
               <a:rPr lang="en-US" smtClean="0"/>
-              <a:t>10/3/2019</a:t>
+              <a:t>11/12/2020</a:t>
             </a:fld>
             <a:endParaRPr lang="en-US"/>
           </a:p>
@@ -1830,7 +1830,7 @@
           <a:p>
             <a:fld id="{0DC86ED9-B0FC-4166-96FE-019390E55704}" type="datetimeFigureOut">
               <a:rPr lang="en-US" smtClean="0"/>
-              <a:t>10/3/2019</a:t>
+              <a:t>11/12/2020</a:t>
             </a:fld>
             <a:endParaRPr lang="en-US"/>
           </a:p>
@@ -2107,7 +2107,7 @@
           <a:p>
             <a:fld id="{0DC86ED9-B0FC-4166-96FE-019390E55704}" type="datetimeFigureOut">
               <a:rPr lang="en-US" smtClean="0"/>
-              <a:t>10/3/2019</a:t>
+              <a:t>11/12/2020</a:t>
             </a:fld>
             <a:endParaRPr lang="en-US"/>
           </a:p>
@@ -2364,7 +2364,7 @@
           <a:p>
             <a:fld id="{0DC86ED9-B0FC-4166-96FE-019390E55704}" type="datetimeFigureOut">
               <a:rPr lang="en-US" smtClean="0"/>
-              <a:t>10/3/2019</a:t>
+              <a:t>11/12/2020</a:t>
             </a:fld>
             <a:endParaRPr lang="en-US"/>
           </a:p>
@@ -2577,7 +2577,7 @@
           <a:p>
             <a:fld id="{0DC86ED9-B0FC-4166-96FE-019390E55704}" type="datetimeFigureOut">
               <a:rPr lang="en-US" smtClean="0"/>
-              <a:t>10/3/2019</a:t>
+              <a:t>11/12/2020</a:t>
             </a:fld>
             <a:endParaRPr lang="en-US"/>
           </a:p>
@@ -4627,7 +4627,7 @@
         <p:spPr>
           <a:xfrm>
             <a:off x="2408486" y="1879483"/>
-            <a:ext cx="1274708" cy="553998"/>
+            <a:ext cx="1305165" cy="553998"/>
           </a:xfrm>
           <a:prstGeom prst="rect">
             <a:avLst/>
@@ -4660,7 +4660,7 @@
               <a:rPr lang="en-US" sz="800">
                 <a:latin typeface="Arial" panose="020B0604020202020204" pitchFamily="34" charset="0"/>
               </a:rPr>
-              <a:t>[Optional, setup Travis]</a:t>
+              <a:t>[Optional, setup Actions]</a:t>
             </a:r>
           </a:p>
         </p:txBody>
@@ -5032,7 +5032,7 @@
               <a:rPr lang="en-US" sz="800">
                 <a:latin typeface="Arial" panose="020B0604020202020204" pitchFamily="34" charset="0"/>
               </a:rPr>
-              <a:t>[Check Travis]</a:t>
+              <a:t>[Check GitHub Actions]</a:t>
             </a:r>
           </a:p>
         </p:txBody>
@@ -5283,7 +5283,7 @@
               <a:rPr lang="en-US" sz="800">
                 <a:latin typeface="Arial" panose="020B0604020202020204" pitchFamily="34" charset="0"/>
               </a:rPr>
-              <a:t>[Wait for Travis]</a:t>
+              <a:t>[Wait for tests on GitHub Actions]</a:t>
             </a:r>
           </a:p>
           <a:p>

</xml_diff>

<commit_message>
Changed repositories figure to mention github actions instead of travis. (#528)
</commit_message>
<xml_diff>
--- a/talks/repositories.pptx
+++ b/talks/repositories.pptx
@@ -254,7 +254,7 @@
           <a:p>
             <a:fld id="{0DC86ED9-B0FC-4166-96FE-019390E55704}" type="datetimeFigureOut">
               <a:rPr lang="en-US" smtClean="0"/>
-              <a:t>10/3/2019</a:t>
+              <a:t>11/12/2020</a:t>
             </a:fld>
             <a:endParaRPr lang="en-US"/>
           </a:p>
@@ -424,7 +424,7 @@
           <a:p>
             <a:fld id="{0DC86ED9-B0FC-4166-96FE-019390E55704}" type="datetimeFigureOut">
               <a:rPr lang="en-US" smtClean="0"/>
-              <a:t>10/3/2019</a:t>
+              <a:t>11/12/2020</a:t>
             </a:fld>
             <a:endParaRPr lang="en-US"/>
           </a:p>
@@ -604,7 +604,7 @@
           <a:p>
             <a:fld id="{0DC86ED9-B0FC-4166-96FE-019390E55704}" type="datetimeFigureOut">
               <a:rPr lang="en-US" smtClean="0"/>
-              <a:t>10/3/2019</a:t>
+              <a:t>11/12/2020</a:t>
             </a:fld>
             <a:endParaRPr lang="en-US"/>
           </a:p>
@@ -774,7 +774,7 @@
           <a:p>
             <a:fld id="{0DC86ED9-B0FC-4166-96FE-019390E55704}" type="datetimeFigureOut">
               <a:rPr lang="en-US" smtClean="0"/>
-              <a:t>10/3/2019</a:t>
+              <a:t>11/12/2020</a:t>
             </a:fld>
             <a:endParaRPr lang="en-US"/>
           </a:p>
@@ -1018,7 +1018,7 @@
           <a:p>
             <a:fld id="{0DC86ED9-B0FC-4166-96FE-019390E55704}" type="datetimeFigureOut">
               <a:rPr lang="en-US" smtClean="0"/>
-              <a:t>10/3/2019</a:t>
+              <a:t>11/12/2020</a:t>
             </a:fld>
             <a:endParaRPr lang="en-US"/>
           </a:p>
@@ -1250,7 +1250,7 @@
           <a:p>
             <a:fld id="{0DC86ED9-B0FC-4166-96FE-019390E55704}" type="datetimeFigureOut">
               <a:rPr lang="en-US" smtClean="0"/>
-              <a:t>10/3/2019</a:t>
+              <a:t>11/12/2020</a:t>
             </a:fld>
             <a:endParaRPr lang="en-US"/>
           </a:p>
@@ -1617,7 +1617,7 @@
           <a:p>
             <a:fld id="{0DC86ED9-B0FC-4166-96FE-019390E55704}" type="datetimeFigureOut">
               <a:rPr lang="en-US" smtClean="0"/>
-              <a:t>10/3/2019</a:t>
+              <a:t>11/12/2020</a:t>
             </a:fld>
             <a:endParaRPr lang="en-US"/>
           </a:p>
@@ -1735,7 +1735,7 @@
           <a:p>
             <a:fld id="{0DC86ED9-B0FC-4166-96FE-019390E55704}" type="datetimeFigureOut">
               <a:rPr lang="en-US" smtClean="0"/>
-              <a:t>10/3/2019</a:t>
+              <a:t>11/12/2020</a:t>
             </a:fld>
             <a:endParaRPr lang="en-US"/>
           </a:p>
@@ -1830,7 +1830,7 @@
           <a:p>
             <a:fld id="{0DC86ED9-B0FC-4166-96FE-019390E55704}" type="datetimeFigureOut">
               <a:rPr lang="en-US" smtClean="0"/>
-              <a:t>10/3/2019</a:t>
+              <a:t>11/12/2020</a:t>
             </a:fld>
             <a:endParaRPr lang="en-US"/>
           </a:p>
@@ -2107,7 +2107,7 @@
           <a:p>
             <a:fld id="{0DC86ED9-B0FC-4166-96FE-019390E55704}" type="datetimeFigureOut">
               <a:rPr lang="en-US" smtClean="0"/>
-              <a:t>10/3/2019</a:t>
+              <a:t>11/12/2020</a:t>
             </a:fld>
             <a:endParaRPr lang="en-US"/>
           </a:p>
@@ -2364,7 +2364,7 @@
           <a:p>
             <a:fld id="{0DC86ED9-B0FC-4166-96FE-019390E55704}" type="datetimeFigureOut">
               <a:rPr lang="en-US" smtClean="0"/>
-              <a:t>10/3/2019</a:t>
+              <a:t>11/12/2020</a:t>
             </a:fld>
             <a:endParaRPr lang="en-US"/>
           </a:p>
@@ -2577,7 +2577,7 @@
           <a:p>
             <a:fld id="{0DC86ED9-B0FC-4166-96FE-019390E55704}" type="datetimeFigureOut">
               <a:rPr lang="en-US" smtClean="0"/>
-              <a:t>10/3/2019</a:t>
+              <a:t>11/12/2020</a:t>
             </a:fld>
             <a:endParaRPr lang="en-US"/>
           </a:p>
@@ -4627,7 +4627,7 @@
         <p:spPr>
           <a:xfrm>
             <a:off x="2408486" y="1879483"/>
-            <a:ext cx="1274708" cy="553998"/>
+            <a:ext cx="1305165" cy="553998"/>
           </a:xfrm>
           <a:prstGeom prst="rect">
             <a:avLst/>
@@ -4660,7 +4660,7 @@
               <a:rPr lang="en-US" sz="800">
                 <a:latin typeface="Arial" panose="020B0604020202020204" pitchFamily="34" charset="0"/>
               </a:rPr>
-              <a:t>[Optional, setup Travis]</a:t>
+              <a:t>[Optional, setup Actions]</a:t>
             </a:r>
           </a:p>
         </p:txBody>
@@ -5032,7 +5032,7 @@
               <a:rPr lang="en-US" sz="800">
                 <a:latin typeface="Arial" panose="020B0604020202020204" pitchFamily="34" charset="0"/>
               </a:rPr>
-              <a:t>[Check Travis]</a:t>
+              <a:t>[Check GitHub Actions]</a:t>
             </a:r>
           </a:p>
         </p:txBody>
@@ -5283,7 +5283,7 @@
               <a:rPr lang="en-US" sz="800">
                 <a:latin typeface="Arial" panose="020B0604020202020204" pitchFamily="34" charset="0"/>
               </a:rPr>
-              <a:t>[Wait for Travis]</a:t>
+              <a:t>[Wait for tests on GitHub Actions]</a:t>
             </a:r>
           </a:p>
           <a:p>

</xml_diff>

<commit_message>
Updated the contribution guidelines to encourage `git@github` instead of `https`, and to add instructions for skipping Pyright locally.
</commit_message>
<xml_diff>
--- a/talks/repositories.pptx
+++ b/talks/repositories.pptx
@@ -254,7 +254,7 @@
           <a:p>
             <a:fld id="{0DC86ED9-B0FC-4166-96FE-019390E55704}" type="datetimeFigureOut">
               <a:rPr lang="en-US" smtClean="0"/>
-              <a:t>11/12/2020</a:t>
+              <a:t>4/23/2021</a:t>
             </a:fld>
             <a:endParaRPr lang="en-US"/>
           </a:p>
@@ -424,7 +424,7 @@
           <a:p>
             <a:fld id="{0DC86ED9-B0FC-4166-96FE-019390E55704}" type="datetimeFigureOut">
               <a:rPr lang="en-US" smtClean="0"/>
-              <a:t>11/12/2020</a:t>
+              <a:t>4/23/2021</a:t>
             </a:fld>
             <a:endParaRPr lang="en-US"/>
           </a:p>
@@ -604,7 +604,7 @@
           <a:p>
             <a:fld id="{0DC86ED9-B0FC-4166-96FE-019390E55704}" type="datetimeFigureOut">
               <a:rPr lang="en-US" smtClean="0"/>
-              <a:t>11/12/2020</a:t>
+              <a:t>4/23/2021</a:t>
             </a:fld>
             <a:endParaRPr lang="en-US"/>
           </a:p>
@@ -774,7 +774,7 @@
           <a:p>
             <a:fld id="{0DC86ED9-B0FC-4166-96FE-019390E55704}" type="datetimeFigureOut">
               <a:rPr lang="en-US" smtClean="0"/>
-              <a:t>11/12/2020</a:t>
+              <a:t>4/23/2021</a:t>
             </a:fld>
             <a:endParaRPr lang="en-US"/>
           </a:p>
@@ -1018,7 +1018,7 @@
           <a:p>
             <a:fld id="{0DC86ED9-B0FC-4166-96FE-019390E55704}" type="datetimeFigureOut">
               <a:rPr lang="en-US" smtClean="0"/>
-              <a:t>11/12/2020</a:t>
+              <a:t>4/23/2021</a:t>
             </a:fld>
             <a:endParaRPr lang="en-US"/>
           </a:p>
@@ -1250,7 +1250,7 @@
           <a:p>
             <a:fld id="{0DC86ED9-B0FC-4166-96FE-019390E55704}" type="datetimeFigureOut">
               <a:rPr lang="en-US" smtClean="0"/>
-              <a:t>11/12/2020</a:t>
+              <a:t>4/23/2021</a:t>
             </a:fld>
             <a:endParaRPr lang="en-US"/>
           </a:p>
@@ -1617,7 +1617,7 @@
           <a:p>
             <a:fld id="{0DC86ED9-B0FC-4166-96FE-019390E55704}" type="datetimeFigureOut">
               <a:rPr lang="en-US" smtClean="0"/>
-              <a:t>11/12/2020</a:t>
+              <a:t>4/23/2021</a:t>
             </a:fld>
             <a:endParaRPr lang="en-US"/>
           </a:p>
@@ -1735,7 +1735,7 @@
           <a:p>
             <a:fld id="{0DC86ED9-B0FC-4166-96FE-019390E55704}" type="datetimeFigureOut">
               <a:rPr lang="en-US" smtClean="0"/>
-              <a:t>11/12/2020</a:t>
+              <a:t>4/23/2021</a:t>
             </a:fld>
             <a:endParaRPr lang="en-US"/>
           </a:p>
@@ -1830,7 +1830,7 @@
           <a:p>
             <a:fld id="{0DC86ED9-B0FC-4166-96FE-019390E55704}" type="datetimeFigureOut">
               <a:rPr lang="en-US" smtClean="0"/>
-              <a:t>11/12/2020</a:t>
+              <a:t>4/23/2021</a:t>
             </a:fld>
             <a:endParaRPr lang="en-US"/>
           </a:p>
@@ -2107,7 +2107,7 @@
           <a:p>
             <a:fld id="{0DC86ED9-B0FC-4166-96FE-019390E55704}" type="datetimeFigureOut">
               <a:rPr lang="en-US" smtClean="0"/>
-              <a:t>11/12/2020</a:t>
+              <a:t>4/23/2021</a:t>
             </a:fld>
             <a:endParaRPr lang="en-US"/>
           </a:p>
@@ -2364,7 +2364,7 @@
           <a:p>
             <a:fld id="{0DC86ED9-B0FC-4166-96FE-019390E55704}" type="datetimeFigureOut">
               <a:rPr lang="en-US" smtClean="0"/>
-              <a:t>11/12/2020</a:t>
+              <a:t>4/23/2021</a:t>
             </a:fld>
             <a:endParaRPr lang="en-US"/>
           </a:p>
@@ -2577,7 +2577,7 @@
           <a:p>
             <a:fld id="{0DC86ED9-B0FC-4166-96FE-019390E55704}" type="datetimeFigureOut">
               <a:rPr lang="en-US" smtClean="0"/>
-              <a:t>11/12/2020</a:t>
+              <a:t>4/23/2021</a:t>
             </a:fld>
             <a:endParaRPr lang="en-US"/>
           </a:p>
@@ -4725,7 +4725,7 @@
         <p:spPr>
           <a:xfrm>
             <a:off x="3667836" y="1746211"/>
-            <a:ext cx="2669320" cy="677108"/>
+            <a:ext cx="2571538" cy="677108"/>
           </a:xfrm>
           <a:prstGeom prst="rect">
             <a:avLst/>
@@ -4750,7 +4750,7 @@
               <a:rPr lang="en-US" sz="800">
                 <a:latin typeface="Arial" panose="020B0604020202020204" pitchFamily="34" charset="0"/>
               </a:rPr>
-              <a:t>git clone https://</a:t>
+              <a:t>git clone git@github.com:</a:t>
             </a:r>
             <a:r>
               <a:rPr lang="en-US" sz="800" i="1">
@@ -4762,41 +4762,29 @@
               <a:rPr lang="en-US" sz="800">
                 <a:latin typeface="Arial" panose="020B0604020202020204" pitchFamily="34" charset="0"/>
               </a:rPr>
-              <a:t>@github.com/</a:t>
-            </a:r>
-            <a:r>
-              <a:rPr lang="en-US" sz="800" i="1">
-                <a:latin typeface="Arial" panose="020B0604020202020204" pitchFamily="34" charset="0"/>
-              </a:rPr>
-              <a:t>user</a:t>
-            </a:r>
+              <a:t>/lale.git</a:t>
+            </a:r>
+          </a:p>
+          <a:p>
+            <a:r>
+              <a:rPr lang="fr-FR" sz="800">
+                <a:latin typeface="Arial" panose="020B0604020202020204" pitchFamily="34" charset="0"/>
+              </a:rPr>
+              <a:t>git config user.email </a:t>
+            </a:r>
+            <a:r>
+              <a:rPr lang="fr-FR" sz="800" i="1">
+                <a:latin typeface="Arial" panose="020B0604020202020204" pitchFamily="34" charset="0"/>
+              </a:rPr>
+              <a:t>email</a:t>
+            </a:r>
+          </a:p>
+          <a:p>
             <a:r>
               <a:rPr lang="en-US" sz="800">
                 <a:latin typeface="Arial" panose="020B0604020202020204" pitchFamily="34" charset="0"/>
               </a:rPr>
-              <a:t>/lale.git</a:t>
-            </a:r>
-          </a:p>
-          <a:p>
-            <a:r>
-              <a:rPr lang="fr-FR" sz="800">
-                <a:latin typeface="Arial" panose="020B0604020202020204" pitchFamily="34" charset="0"/>
-              </a:rPr>
-              <a:t>git config user.email </a:t>
-            </a:r>
-            <a:r>
-              <a:rPr lang="fr-FR" sz="800" i="1">
-                <a:latin typeface="Arial" panose="020B0604020202020204" pitchFamily="34" charset="0"/>
-              </a:rPr>
-              <a:t>email</a:t>
-            </a:r>
-          </a:p>
-          <a:p>
-            <a:r>
-              <a:rPr lang="en-US" sz="800">
-                <a:latin typeface="Arial" panose="020B0604020202020204" pitchFamily="34" charset="0"/>
-              </a:rPr>
-              <a:t>git remote add upstream https://github.com/ibm/lale.git</a:t>
+              <a:t>git remote add upstream git@github.com:ibm/lale.git</a:t>
             </a:r>
           </a:p>
         </p:txBody>
@@ -5250,7 +5238,7 @@
         <p:spPr>
           <a:xfrm>
             <a:off x="1980507" y="3787719"/>
-            <a:ext cx="2056973" cy="923330"/>
+            <a:ext cx="2056973" cy="1046440"/>
           </a:xfrm>
           <a:prstGeom prst="rect">
             <a:avLst/>
@@ -5299,7 +5287,15 @@
               <a:rPr lang="en-US" sz="800">
                 <a:latin typeface="Arial" panose="020B0604020202020204" pitchFamily="34" charset="0"/>
               </a:rPr>
-              <a:t>[Optional:] git branch –d </a:t>
+              <a:t>[Optional:] git checkout master</a:t>
+            </a:r>
+          </a:p>
+          <a:p>
+            <a:r>
+              <a:rPr lang="en-US" sz="800">
+                <a:latin typeface="Arial" panose="020B0604020202020204" pitchFamily="34" charset="0"/>
+              </a:rPr>
+              <a:t>[Optional:] git branch –D </a:t>
             </a:r>
             <a:r>
               <a:rPr lang="en-US" sz="800" i="1">

</xml_diff>

<commit_message>
Updated the contribution guidelines to encourage `git@github` instead… (#681)
* Updated the contribution guidelines to encourage `git@github` instead of `https`, and to add instructions for skipping Pyright locally.

* Relaxing hardcoded test threshold for AdversarialDebiasing.
</commit_message>
<xml_diff>
--- a/talks/repositories.pptx
+++ b/talks/repositories.pptx
@@ -254,7 +254,7 @@
           <a:p>
             <a:fld id="{0DC86ED9-B0FC-4166-96FE-019390E55704}" type="datetimeFigureOut">
               <a:rPr lang="en-US" smtClean="0"/>
-              <a:t>11/12/2020</a:t>
+              <a:t>4/23/2021</a:t>
             </a:fld>
             <a:endParaRPr lang="en-US"/>
           </a:p>
@@ -424,7 +424,7 @@
           <a:p>
             <a:fld id="{0DC86ED9-B0FC-4166-96FE-019390E55704}" type="datetimeFigureOut">
               <a:rPr lang="en-US" smtClean="0"/>
-              <a:t>11/12/2020</a:t>
+              <a:t>4/23/2021</a:t>
             </a:fld>
             <a:endParaRPr lang="en-US"/>
           </a:p>
@@ -604,7 +604,7 @@
           <a:p>
             <a:fld id="{0DC86ED9-B0FC-4166-96FE-019390E55704}" type="datetimeFigureOut">
               <a:rPr lang="en-US" smtClean="0"/>
-              <a:t>11/12/2020</a:t>
+              <a:t>4/23/2021</a:t>
             </a:fld>
             <a:endParaRPr lang="en-US"/>
           </a:p>
@@ -774,7 +774,7 @@
           <a:p>
             <a:fld id="{0DC86ED9-B0FC-4166-96FE-019390E55704}" type="datetimeFigureOut">
               <a:rPr lang="en-US" smtClean="0"/>
-              <a:t>11/12/2020</a:t>
+              <a:t>4/23/2021</a:t>
             </a:fld>
             <a:endParaRPr lang="en-US"/>
           </a:p>
@@ -1018,7 +1018,7 @@
           <a:p>
             <a:fld id="{0DC86ED9-B0FC-4166-96FE-019390E55704}" type="datetimeFigureOut">
               <a:rPr lang="en-US" smtClean="0"/>
-              <a:t>11/12/2020</a:t>
+              <a:t>4/23/2021</a:t>
             </a:fld>
             <a:endParaRPr lang="en-US"/>
           </a:p>
@@ -1250,7 +1250,7 @@
           <a:p>
             <a:fld id="{0DC86ED9-B0FC-4166-96FE-019390E55704}" type="datetimeFigureOut">
               <a:rPr lang="en-US" smtClean="0"/>
-              <a:t>11/12/2020</a:t>
+              <a:t>4/23/2021</a:t>
             </a:fld>
             <a:endParaRPr lang="en-US"/>
           </a:p>
@@ -1617,7 +1617,7 @@
           <a:p>
             <a:fld id="{0DC86ED9-B0FC-4166-96FE-019390E55704}" type="datetimeFigureOut">
               <a:rPr lang="en-US" smtClean="0"/>
-              <a:t>11/12/2020</a:t>
+              <a:t>4/23/2021</a:t>
             </a:fld>
             <a:endParaRPr lang="en-US"/>
           </a:p>
@@ -1735,7 +1735,7 @@
           <a:p>
             <a:fld id="{0DC86ED9-B0FC-4166-96FE-019390E55704}" type="datetimeFigureOut">
               <a:rPr lang="en-US" smtClean="0"/>
-              <a:t>11/12/2020</a:t>
+              <a:t>4/23/2021</a:t>
             </a:fld>
             <a:endParaRPr lang="en-US"/>
           </a:p>
@@ -1830,7 +1830,7 @@
           <a:p>
             <a:fld id="{0DC86ED9-B0FC-4166-96FE-019390E55704}" type="datetimeFigureOut">
               <a:rPr lang="en-US" smtClean="0"/>
-              <a:t>11/12/2020</a:t>
+              <a:t>4/23/2021</a:t>
             </a:fld>
             <a:endParaRPr lang="en-US"/>
           </a:p>
@@ -2107,7 +2107,7 @@
           <a:p>
             <a:fld id="{0DC86ED9-B0FC-4166-96FE-019390E55704}" type="datetimeFigureOut">
               <a:rPr lang="en-US" smtClean="0"/>
-              <a:t>11/12/2020</a:t>
+              <a:t>4/23/2021</a:t>
             </a:fld>
             <a:endParaRPr lang="en-US"/>
           </a:p>
@@ -2364,7 +2364,7 @@
           <a:p>
             <a:fld id="{0DC86ED9-B0FC-4166-96FE-019390E55704}" type="datetimeFigureOut">
               <a:rPr lang="en-US" smtClean="0"/>
-              <a:t>11/12/2020</a:t>
+              <a:t>4/23/2021</a:t>
             </a:fld>
             <a:endParaRPr lang="en-US"/>
           </a:p>
@@ -2577,7 +2577,7 @@
           <a:p>
             <a:fld id="{0DC86ED9-B0FC-4166-96FE-019390E55704}" type="datetimeFigureOut">
               <a:rPr lang="en-US" smtClean="0"/>
-              <a:t>11/12/2020</a:t>
+              <a:t>4/23/2021</a:t>
             </a:fld>
             <a:endParaRPr lang="en-US"/>
           </a:p>
@@ -4725,7 +4725,7 @@
         <p:spPr>
           <a:xfrm>
             <a:off x="3667836" y="1746211"/>
-            <a:ext cx="2669320" cy="677108"/>
+            <a:ext cx="2571538" cy="677108"/>
           </a:xfrm>
           <a:prstGeom prst="rect">
             <a:avLst/>
@@ -4750,7 +4750,7 @@
               <a:rPr lang="en-US" sz="800">
                 <a:latin typeface="Arial" panose="020B0604020202020204" pitchFamily="34" charset="0"/>
               </a:rPr>
-              <a:t>git clone https://</a:t>
+              <a:t>git clone git@github.com:</a:t>
             </a:r>
             <a:r>
               <a:rPr lang="en-US" sz="800" i="1">
@@ -4762,41 +4762,29 @@
               <a:rPr lang="en-US" sz="800">
                 <a:latin typeface="Arial" panose="020B0604020202020204" pitchFamily="34" charset="0"/>
               </a:rPr>
-              <a:t>@github.com/</a:t>
-            </a:r>
-            <a:r>
-              <a:rPr lang="en-US" sz="800" i="1">
-                <a:latin typeface="Arial" panose="020B0604020202020204" pitchFamily="34" charset="0"/>
-              </a:rPr>
-              <a:t>user</a:t>
-            </a:r>
+              <a:t>/lale.git</a:t>
+            </a:r>
+          </a:p>
+          <a:p>
+            <a:r>
+              <a:rPr lang="fr-FR" sz="800">
+                <a:latin typeface="Arial" panose="020B0604020202020204" pitchFamily="34" charset="0"/>
+              </a:rPr>
+              <a:t>git config user.email </a:t>
+            </a:r>
+            <a:r>
+              <a:rPr lang="fr-FR" sz="800" i="1">
+                <a:latin typeface="Arial" panose="020B0604020202020204" pitchFamily="34" charset="0"/>
+              </a:rPr>
+              <a:t>email</a:t>
+            </a:r>
+          </a:p>
+          <a:p>
             <a:r>
               <a:rPr lang="en-US" sz="800">
                 <a:latin typeface="Arial" panose="020B0604020202020204" pitchFamily="34" charset="0"/>
               </a:rPr>
-              <a:t>/lale.git</a:t>
-            </a:r>
-          </a:p>
-          <a:p>
-            <a:r>
-              <a:rPr lang="fr-FR" sz="800">
-                <a:latin typeface="Arial" panose="020B0604020202020204" pitchFamily="34" charset="0"/>
-              </a:rPr>
-              <a:t>git config user.email </a:t>
-            </a:r>
-            <a:r>
-              <a:rPr lang="fr-FR" sz="800" i="1">
-                <a:latin typeface="Arial" panose="020B0604020202020204" pitchFamily="34" charset="0"/>
-              </a:rPr>
-              <a:t>email</a:t>
-            </a:r>
-          </a:p>
-          <a:p>
-            <a:r>
-              <a:rPr lang="en-US" sz="800">
-                <a:latin typeface="Arial" panose="020B0604020202020204" pitchFamily="34" charset="0"/>
-              </a:rPr>
-              <a:t>git remote add upstream https://github.com/ibm/lale.git</a:t>
+              <a:t>git remote add upstream git@github.com:ibm/lale.git</a:t>
             </a:r>
           </a:p>
         </p:txBody>
@@ -5250,7 +5238,7 @@
         <p:spPr>
           <a:xfrm>
             <a:off x="1980507" y="3787719"/>
-            <a:ext cx="2056973" cy="923330"/>
+            <a:ext cx="2056973" cy="1046440"/>
           </a:xfrm>
           <a:prstGeom prst="rect">
             <a:avLst/>
@@ -5299,7 +5287,15 @@
               <a:rPr lang="en-US" sz="800">
                 <a:latin typeface="Arial" panose="020B0604020202020204" pitchFamily="34" charset="0"/>
               </a:rPr>
-              <a:t>[Optional:] git branch –d </a:t>
+              <a:t>[Optional:] git checkout master</a:t>
+            </a:r>
+          </a:p>
+          <a:p>
+            <a:r>
+              <a:rPr lang="en-US" sz="800">
+                <a:latin typeface="Arial" panose="020B0604020202020204" pitchFamily="34" charset="0"/>
+              </a:rPr>
+              <a:t>[Optional:] git branch –D </a:t>
             </a:r>
             <a:r>
               <a:rPr lang="en-US" sz="800" i="1">

</xml_diff>

<commit_message>
Addressed issue #768; also, updated list of papers.
</commit_message>
<xml_diff>
--- a/talks/repositories.pptx
+++ b/talks/repositories.pptx
@@ -254,7 +254,7 @@
           <a:p>
             <a:fld id="{0DC86ED9-B0FC-4166-96FE-019390E55704}" type="datetimeFigureOut">
               <a:rPr lang="en-US" smtClean="0"/>
-              <a:t>4/23/2021</a:t>
+              <a:t>11/8/2021</a:t>
             </a:fld>
             <a:endParaRPr lang="en-US"/>
           </a:p>
@@ -424,7 +424,7 @@
           <a:p>
             <a:fld id="{0DC86ED9-B0FC-4166-96FE-019390E55704}" type="datetimeFigureOut">
               <a:rPr lang="en-US" smtClean="0"/>
-              <a:t>4/23/2021</a:t>
+              <a:t>11/8/2021</a:t>
             </a:fld>
             <a:endParaRPr lang="en-US"/>
           </a:p>
@@ -604,7 +604,7 @@
           <a:p>
             <a:fld id="{0DC86ED9-B0FC-4166-96FE-019390E55704}" type="datetimeFigureOut">
               <a:rPr lang="en-US" smtClean="0"/>
-              <a:t>4/23/2021</a:t>
+              <a:t>11/8/2021</a:t>
             </a:fld>
             <a:endParaRPr lang="en-US"/>
           </a:p>
@@ -774,7 +774,7 @@
           <a:p>
             <a:fld id="{0DC86ED9-B0FC-4166-96FE-019390E55704}" type="datetimeFigureOut">
               <a:rPr lang="en-US" smtClean="0"/>
-              <a:t>4/23/2021</a:t>
+              <a:t>11/8/2021</a:t>
             </a:fld>
             <a:endParaRPr lang="en-US"/>
           </a:p>
@@ -1018,7 +1018,7 @@
           <a:p>
             <a:fld id="{0DC86ED9-B0FC-4166-96FE-019390E55704}" type="datetimeFigureOut">
               <a:rPr lang="en-US" smtClean="0"/>
-              <a:t>4/23/2021</a:t>
+              <a:t>11/8/2021</a:t>
             </a:fld>
             <a:endParaRPr lang="en-US"/>
           </a:p>
@@ -1250,7 +1250,7 @@
           <a:p>
             <a:fld id="{0DC86ED9-B0FC-4166-96FE-019390E55704}" type="datetimeFigureOut">
               <a:rPr lang="en-US" smtClean="0"/>
-              <a:t>4/23/2021</a:t>
+              <a:t>11/8/2021</a:t>
             </a:fld>
             <a:endParaRPr lang="en-US"/>
           </a:p>
@@ -1617,7 +1617,7 @@
           <a:p>
             <a:fld id="{0DC86ED9-B0FC-4166-96FE-019390E55704}" type="datetimeFigureOut">
               <a:rPr lang="en-US" smtClean="0"/>
-              <a:t>4/23/2021</a:t>
+              <a:t>11/8/2021</a:t>
             </a:fld>
             <a:endParaRPr lang="en-US"/>
           </a:p>
@@ -1735,7 +1735,7 @@
           <a:p>
             <a:fld id="{0DC86ED9-B0FC-4166-96FE-019390E55704}" type="datetimeFigureOut">
               <a:rPr lang="en-US" smtClean="0"/>
-              <a:t>4/23/2021</a:t>
+              <a:t>11/8/2021</a:t>
             </a:fld>
             <a:endParaRPr lang="en-US"/>
           </a:p>
@@ -1830,7 +1830,7 @@
           <a:p>
             <a:fld id="{0DC86ED9-B0FC-4166-96FE-019390E55704}" type="datetimeFigureOut">
               <a:rPr lang="en-US" smtClean="0"/>
-              <a:t>4/23/2021</a:t>
+              <a:t>11/8/2021</a:t>
             </a:fld>
             <a:endParaRPr lang="en-US"/>
           </a:p>
@@ -2107,7 +2107,7 @@
           <a:p>
             <a:fld id="{0DC86ED9-B0FC-4166-96FE-019390E55704}" type="datetimeFigureOut">
               <a:rPr lang="en-US" smtClean="0"/>
-              <a:t>4/23/2021</a:t>
+              <a:t>11/8/2021</a:t>
             </a:fld>
             <a:endParaRPr lang="en-US"/>
           </a:p>
@@ -2364,7 +2364,7 @@
           <a:p>
             <a:fld id="{0DC86ED9-B0FC-4166-96FE-019390E55704}" type="datetimeFigureOut">
               <a:rPr lang="en-US" smtClean="0"/>
-              <a:t>4/23/2021</a:t>
+              <a:t>11/8/2021</a:t>
             </a:fld>
             <a:endParaRPr lang="en-US"/>
           </a:p>
@@ -2577,7 +2577,7 @@
           <a:p>
             <a:fld id="{0DC86ED9-B0FC-4166-96FE-019390E55704}" type="datetimeFigureOut">
               <a:rPr lang="en-US" smtClean="0"/>
-              <a:t>4/23/2021</a:t>
+              <a:t>11/8/2021</a:t>
             </a:fld>
             <a:endParaRPr lang="en-US"/>
           </a:p>
@@ -2996,8 +2996,8 @@
         </p:nvSpPr>
         <p:spPr>
           <a:xfrm>
-            <a:off x="478497" y="206019"/>
-            <a:ext cx="4637610" cy="6217451"/>
+            <a:off x="478497" y="206020"/>
+            <a:ext cx="4637610" cy="5955030"/>
           </a:xfrm>
           <a:prstGeom prst="roundRect">
             <a:avLst>
@@ -3065,12 +3065,12 @@
         </p:nvSpPr>
         <p:spPr>
           <a:xfrm>
-            <a:off x="5199900" y="206019"/>
-            <a:ext cx="3240101" cy="6217451"/>
+            <a:off x="5199900" y="206020"/>
+            <a:ext cx="3240101" cy="5955030"/>
           </a:xfrm>
           <a:prstGeom prst="roundRect">
             <a:avLst>
-              <a:gd name="adj" fmla="val 11787"/>
+              <a:gd name="adj" fmla="val 10927"/>
             </a:avLst>
           </a:prstGeom>
           <a:solidFill>
@@ -3134,8 +3134,8 @@
         </p:nvSpPr>
         <p:spPr>
           <a:xfrm>
-            <a:off x="5942819" y="705986"/>
-            <a:ext cx="1371600" cy="1495085"/>
+            <a:off x="5942819" y="705987"/>
+            <a:ext cx="1371600" cy="1427024"/>
           </a:xfrm>
           <a:prstGeom prst="rect">
             <a:avLst/>
@@ -3849,7 +3849,7 @@
         </p:nvSpPr>
         <p:spPr>
           <a:xfrm>
-            <a:off x="6214179" y="1828154"/>
+            <a:off x="6214179" y="1792863"/>
             <a:ext cx="828880" cy="269715"/>
           </a:xfrm>
           <a:prstGeom prst="rect">
@@ -3930,8 +3930,8 @@
         </p:nvSpPr>
         <p:spPr>
           <a:xfrm>
-            <a:off x="666214" y="4812534"/>
-            <a:ext cx="1371600" cy="1495085"/>
+            <a:off x="666214" y="4812535"/>
+            <a:ext cx="1371600" cy="1192516"/>
           </a:xfrm>
           <a:prstGeom prst="roundRect">
             <a:avLst>
@@ -3999,7 +3999,7 @@
         </p:nvSpPr>
         <p:spPr>
           <a:xfrm>
-            <a:off x="938269" y="5425220"/>
+            <a:off x="938269" y="5252370"/>
             <a:ext cx="828880" cy="269715"/>
           </a:xfrm>
           <a:prstGeom prst="roundRect">
@@ -4066,7 +4066,7 @@
         <p:spPr>
           <a:xfrm>
             <a:off x="3229998" y="4812534"/>
-            <a:ext cx="1371600" cy="1495085"/>
+            <a:ext cx="1371600" cy="1192517"/>
           </a:xfrm>
           <a:prstGeom prst="roundRect">
             <a:avLst>
@@ -4143,7 +4143,7 @@
         </p:nvSpPr>
         <p:spPr>
           <a:xfrm>
-            <a:off x="3501358" y="5425220"/>
+            <a:off x="3501358" y="5252370"/>
             <a:ext cx="828880" cy="269715"/>
           </a:xfrm>
           <a:prstGeom prst="roundRect">
@@ -4209,7 +4209,7 @@
         </p:nvSpPr>
         <p:spPr>
           <a:xfrm>
-            <a:off x="3501358" y="5901339"/>
+            <a:off x="3501358" y="5600249"/>
             <a:ext cx="828880" cy="269715"/>
           </a:xfrm>
           <a:prstGeom prst="roundRect">
@@ -4276,7 +4276,7 @@
         <p:spPr>
           <a:xfrm>
             <a:off x="5942819" y="4806184"/>
-            <a:ext cx="1371600" cy="1495085"/>
+            <a:ext cx="1371600" cy="1198867"/>
           </a:xfrm>
           <a:prstGeom prst="roundRect">
             <a:avLst>
@@ -4353,7 +4353,7 @@
         </p:nvSpPr>
         <p:spPr>
           <a:xfrm>
-            <a:off x="6214874" y="5418870"/>
+            <a:off x="6214874" y="5246020"/>
             <a:ext cx="828880" cy="269715"/>
           </a:xfrm>
           <a:prstGeom prst="roundRect">
@@ -4419,7 +4419,7 @@
         </p:nvSpPr>
         <p:spPr>
           <a:xfrm>
-            <a:off x="6214874" y="5894989"/>
+            <a:off x="6214874" y="5593899"/>
             <a:ext cx="828880" cy="269715"/>
           </a:xfrm>
           <a:prstGeom prst="roundRect">
@@ -4528,8 +4528,8 @@
         </p:nvSpPr>
         <p:spPr>
           <a:xfrm>
-            <a:off x="3398243" y="1003491"/>
-            <a:ext cx="1489510" cy="553998"/>
+            <a:off x="3398243" y="852949"/>
+            <a:ext cx="1619354" cy="677108"/>
           </a:xfrm>
           <a:prstGeom prst="rect">
             <a:avLst/>
@@ -4555,6 +4555,14 @@
                 <a:latin typeface="Arial" panose="020B0604020202020204" pitchFamily="34" charset="0"/>
               </a:rPr>
               <a:t>pip install lale</a:t>
+            </a:r>
+          </a:p>
+          <a:p>
+            <a:r>
+              <a:rPr lang="en-US" sz="800">
+                <a:latin typeface="Arial" panose="020B0604020202020204" pitchFamily="34" charset="0"/>
+              </a:rPr>
+              <a:t>[Alternative: pip install -e .[dev]]</a:t>
             </a:r>
           </a:p>
           <a:p>
@@ -4724,8 +4732,8 @@
         </p:nvSpPr>
         <p:spPr>
           <a:xfrm>
-            <a:off x="3667836" y="1746211"/>
-            <a:ext cx="2571538" cy="677108"/>
+            <a:off x="3667836" y="1645849"/>
+            <a:ext cx="2571538" cy="800219"/>
           </a:xfrm>
           <a:prstGeom prst="rect">
             <a:avLst/>
@@ -4785,6 +4793,14 @@
                 <a:latin typeface="Arial" panose="020B0604020202020204" pitchFamily="34" charset="0"/>
               </a:rPr>
               <a:t>git remote add upstream git@github.com:ibm/lale.git</a:t>
+            </a:r>
+          </a:p>
+          <a:p>
+            <a:r>
+              <a:rPr lang="en-US" sz="800">
+                <a:latin typeface="Arial" panose="020B0604020202020204" pitchFamily="34" charset="0"/>
+              </a:rPr>
+              <a:t>pre-commit install</a:t>
             </a:r>
           </a:p>
         </p:txBody>

</xml_diff>

<commit_message>
Addressed issue #768; also, updated list of papers. (#870)
</commit_message>
<xml_diff>
--- a/talks/repositories.pptx
+++ b/talks/repositories.pptx
@@ -254,7 +254,7 @@
           <a:p>
             <a:fld id="{0DC86ED9-B0FC-4166-96FE-019390E55704}" type="datetimeFigureOut">
               <a:rPr lang="en-US" smtClean="0"/>
-              <a:t>4/23/2021</a:t>
+              <a:t>11/8/2021</a:t>
             </a:fld>
             <a:endParaRPr lang="en-US"/>
           </a:p>
@@ -424,7 +424,7 @@
           <a:p>
             <a:fld id="{0DC86ED9-B0FC-4166-96FE-019390E55704}" type="datetimeFigureOut">
               <a:rPr lang="en-US" smtClean="0"/>
-              <a:t>4/23/2021</a:t>
+              <a:t>11/8/2021</a:t>
             </a:fld>
             <a:endParaRPr lang="en-US"/>
           </a:p>
@@ -604,7 +604,7 @@
           <a:p>
             <a:fld id="{0DC86ED9-B0FC-4166-96FE-019390E55704}" type="datetimeFigureOut">
               <a:rPr lang="en-US" smtClean="0"/>
-              <a:t>4/23/2021</a:t>
+              <a:t>11/8/2021</a:t>
             </a:fld>
             <a:endParaRPr lang="en-US"/>
           </a:p>
@@ -774,7 +774,7 @@
           <a:p>
             <a:fld id="{0DC86ED9-B0FC-4166-96FE-019390E55704}" type="datetimeFigureOut">
               <a:rPr lang="en-US" smtClean="0"/>
-              <a:t>4/23/2021</a:t>
+              <a:t>11/8/2021</a:t>
             </a:fld>
             <a:endParaRPr lang="en-US"/>
           </a:p>
@@ -1018,7 +1018,7 @@
           <a:p>
             <a:fld id="{0DC86ED9-B0FC-4166-96FE-019390E55704}" type="datetimeFigureOut">
               <a:rPr lang="en-US" smtClean="0"/>
-              <a:t>4/23/2021</a:t>
+              <a:t>11/8/2021</a:t>
             </a:fld>
             <a:endParaRPr lang="en-US"/>
           </a:p>
@@ -1250,7 +1250,7 @@
           <a:p>
             <a:fld id="{0DC86ED9-B0FC-4166-96FE-019390E55704}" type="datetimeFigureOut">
               <a:rPr lang="en-US" smtClean="0"/>
-              <a:t>4/23/2021</a:t>
+              <a:t>11/8/2021</a:t>
             </a:fld>
             <a:endParaRPr lang="en-US"/>
           </a:p>
@@ -1617,7 +1617,7 @@
           <a:p>
             <a:fld id="{0DC86ED9-B0FC-4166-96FE-019390E55704}" type="datetimeFigureOut">
               <a:rPr lang="en-US" smtClean="0"/>
-              <a:t>4/23/2021</a:t>
+              <a:t>11/8/2021</a:t>
             </a:fld>
             <a:endParaRPr lang="en-US"/>
           </a:p>
@@ -1735,7 +1735,7 @@
           <a:p>
             <a:fld id="{0DC86ED9-B0FC-4166-96FE-019390E55704}" type="datetimeFigureOut">
               <a:rPr lang="en-US" smtClean="0"/>
-              <a:t>4/23/2021</a:t>
+              <a:t>11/8/2021</a:t>
             </a:fld>
             <a:endParaRPr lang="en-US"/>
           </a:p>
@@ -1830,7 +1830,7 @@
           <a:p>
             <a:fld id="{0DC86ED9-B0FC-4166-96FE-019390E55704}" type="datetimeFigureOut">
               <a:rPr lang="en-US" smtClean="0"/>
-              <a:t>4/23/2021</a:t>
+              <a:t>11/8/2021</a:t>
             </a:fld>
             <a:endParaRPr lang="en-US"/>
           </a:p>
@@ -2107,7 +2107,7 @@
           <a:p>
             <a:fld id="{0DC86ED9-B0FC-4166-96FE-019390E55704}" type="datetimeFigureOut">
               <a:rPr lang="en-US" smtClean="0"/>
-              <a:t>4/23/2021</a:t>
+              <a:t>11/8/2021</a:t>
             </a:fld>
             <a:endParaRPr lang="en-US"/>
           </a:p>
@@ -2364,7 +2364,7 @@
           <a:p>
             <a:fld id="{0DC86ED9-B0FC-4166-96FE-019390E55704}" type="datetimeFigureOut">
               <a:rPr lang="en-US" smtClean="0"/>
-              <a:t>4/23/2021</a:t>
+              <a:t>11/8/2021</a:t>
             </a:fld>
             <a:endParaRPr lang="en-US"/>
           </a:p>
@@ -2577,7 +2577,7 @@
           <a:p>
             <a:fld id="{0DC86ED9-B0FC-4166-96FE-019390E55704}" type="datetimeFigureOut">
               <a:rPr lang="en-US" smtClean="0"/>
-              <a:t>4/23/2021</a:t>
+              <a:t>11/8/2021</a:t>
             </a:fld>
             <a:endParaRPr lang="en-US"/>
           </a:p>
@@ -2996,8 +2996,8 @@
         </p:nvSpPr>
         <p:spPr>
           <a:xfrm>
-            <a:off x="478497" y="206019"/>
-            <a:ext cx="4637610" cy="6217451"/>
+            <a:off x="478497" y="206020"/>
+            <a:ext cx="4637610" cy="5955030"/>
           </a:xfrm>
           <a:prstGeom prst="roundRect">
             <a:avLst>
@@ -3065,12 +3065,12 @@
         </p:nvSpPr>
         <p:spPr>
           <a:xfrm>
-            <a:off x="5199900" y="206019"/>
-            <a:ext cx="3240101" cy="6217451"/>
+            <a:off x="5199900" y="206020"/>
+            <a:ext cx="3240101" cy="5955030"/>
           </a:xfrm>
           <a:prstGeom prst="roundRect">
             <a:avLst>
-              <a:gd name="adj" fmla="val 11787"/>
+              <a:gd name="adj" fmla="val 10927"/>
             </a:avLst>
           </a:prstGeom>
           <a:solidFill>
@@ -3134,8 +3134,8 @@
         </p:nvSpPr>
         <p:spPr>
           <a:xfrm>
-            <a:off x="5942819" y="705986"/>
-            <a:ext cx="1371600" cy="1495085"/>
+            <a:off x="5942819" y="705987"/>
+            <a:ext cx="1371600" cy="1427024"/>
           </a:xfrm>
           <a:prstGeom prst="rect">
             <a:avLst/>
@@ -3849,7 +3849,7 @@
         </p:nvSpPr>
         <p:spPr>
           <a:xfrm>
-            <a:off x="6214179" y="1828154"/>
+            <a:off x="6214179" y="1792863"/>
             <a:ext cx="828880" cy="269715"/>
           </a:xfrm>
           <a:prstGeom prst="rect">
@@ -3930,8 +3930,8 @@
         </p:nvSpPr>
         <p:spPr>
           <a:xfrm>
-            <a:off x="666214" y="4812534"/>
-            <a:ext cx="1371600" cy="1495085"/>
+            <a:off x="666214" y="4812535"/>
+            <a:ext cx="1371600" cy="1192516"/>
           </a:xfrm>
           <a:prstGeom prst="roundRect">
             <a:avLst>
@@ -3999,7 +3999,7 @@
         </p:nvSpPr>
         <p:spPr>
           <a:xfrm>
-            <a:off x="938269" y="5425220"/>
+            <a:off x="938269" y="5252370"/>
             <a:ext cx="828880" cy="269715"/>
           </a:xfrm>
           <a:prstGeom prst="roundRect">
@@ -4066,7 +4066,7 @@
         <p:spPr>
           <a:xfrm>
             <a:off x="3229998" y="4812534"/>
-            <a:ext cx="1371600" cy="1495085"/>
+            <a:ext cx="1371600" cy="1192517"/>
           </a:xfrm>
           <a:prstGeom prst="roundRect">
             <a:avLst>
@@ -4143,7 +4143,7 @@
         </p:nvSpPr>
         <p:spPr>
           <a:xfrm>
-            <a:off x="3501358" y="5425220"/>
+            <a:off x="3501358" y="5252370"/>
             <a:ext cx="828880" cy="269715"/>
           </a:xfrm>
           <a:prstGeom prst="roundRect">
@@ -4209,7 +4209,7 @@
         </p:nvSpPr>
         <p:spPr>
           <a:xfrm>
-            <a:off x="3501358" y="5901339"/>
+            <a:off x="3501358" y="5600249"/>
             <a:ext cx="828880" cy="269715"/>
           </a:xfrm>
           <a:prstGeom prst="roundRect">
@@ -4276,7 +4276,7 @@
         <p:spPr>
           <a:xfrm>
             <a:off x="5942819" y="4806184"/>
-            <a:ext cx="1371600" cy="1495085"/>
+            <a:ext cx="1371600" cy="1198867"/>
           </a:xfrm>
           <a:prstGeom prst="roundRect">
             <a:avLst>
@@ -4353,7 +4353,7 @@
         </p:nvSpPr>
         <p:spPr>
           <a:xfrm>
-            <a:off x="6214874" y="5418870"/>
+            <a:off x="6214874" y="5246020"/>
             <a:ext cx="828880" cy="269715"/>
           </a:xfrm>
           <a:prstGeom prst="roundRect">
@@ -4419,7 +4419,7 @@
         </p:nvSpPr>
         <p:spPr>
           <a:xfrm>
-            <a:off x="6214874" y="5894989"/>
+            <a:off x="6214874" y="5593899"/>
             <a:ext cx="828880" cy="269715"/>
           </a:xfrm>
           <a:prstGeom prst="roundRect">
@@ -4528,8 +4528,8 @@
         </p:nvSpPr>
         <p:spPr>
           <a:xfrm>
-            <a:off x="3398243" y="1003491"/>
-            <a:ext cx="1489510" cy="553998"/>
+            <a:off x="3398243" y="852949"/>
+            <a:ext cx="1619354" cy="677108"/>
           </a:xfrm>
           <a:prstGeom prst="rect">
             <a:avLst/>
@@ -4555,6 +4555,14 @@
                 <a:latin typeface="Arial" panose="020B0604020202020204" pitchFamily="34" charset="0"/>
               </a:rPr>
               <a:t>pip install lale</a:t>
+            </a:r>
+          </a:p>
+          <a:p>
+            <a:r>
+              <a:rPr lang="en-US" sz="800">
+                <a:latin typeface="Arial" panose="020B0604020202020204" pitchFamily="34" charset="0"/>
+              </a:rPr>
+              <a:t>[Alternative: pip install -e .[dev]]</a:t>
             </a:r>
           </a:p>
           <a:p>
@@ -4724,8 +4732,8 @@
         </p:nvSpPr>
         <p:spPr>
           <a:xfrm>
-            <a:off x="3667836" y="1746211"/>
-            <a:ext cx="2571538" cy="677108"/>
+            <a:off x="3667836" y="1645849"/>
+            <a:ext cx="2571538" cy="800219"/>
           </a:xfrm>
           <a:prstGeom prst="rect">
             <a:avLst/>
@@ -4785,6 +4793,14 @@
                 <a:latin typeface="Arial" panose="020B0604020202020204" pitchFamily="34" charset="0"/>
               </a:rPr>
               <a:t>git remote add upstream git@github.com:ibm/lale.git</a:t>
+            </a:r>
+          </a:p>
+          <a:p>
+            <a:r>
+              <a:rPr lang="en-US" sz="800">
+                <a:latin typeface="Arial" panose="020B0604020202020204" pitchFamily="34" charset="0"/>
+              </a:rPr>
+              <a:t>pre-commit install</a:t>
             </a:r>
           </a:p>
         </p:txBody>

</xml_diff>

<commit_message>
Updated the GitHub workflow picture to mention Python 3.7 instead of 3.6. Updated the NeurIPS paper link to point to the official pre-proceedings. Also, added the slides for the NeurIPS talk.
</commit_message>
<xml_diff>
--- a/talks/repositories.pptx
+++ b/talks/repositories.pptx
@@ -254,7 +254,7 @@
           <a:p>
             <a:fld id="{0DC86ED9-B0FC-4166-96FE-019390E55704}" type="datetimeFigureOut">
               <a:rPr lang="en-US" smtClean="0"/>
-              <a:t>11/8/2021</a:t>
+              <a:t>12/8/2021</a:t>
             </a:fld>
             <a:endParaRPr lang="en-US"/>
           </a:p>
@@ -424,7 +424,7 @@
           <a:p>
             <a:fld id="{0DC86ED9-B0FC-4166-96FE-019390E55704}" type="datetimeFigureOut">
               <a:rPr lang="en-US" smtClean="0"/>
-              <a:t>11/8/2021</a:t>
+              <a:t>12/8/2021</a:t>
             </a:fld>
             <a:endParaRPr lang="en-US"/>
           </a:p>
@@ -604,7 +604,7 @@
           <a:p>
             <a:fld id="{0DC86ED9-B0FC-4166-96FE-019390E55704}" type="datetimeFigureOut">
               <a:rPr lang="en-US" smtClean="0"/>
-              <a:t>11/8/2021</a:t>
+              <a:t>12/8/2021</a:t>
             </a:fld>
             <a:endParaRPr lang="en-US"/>
           </a:p>
@@ -774,7 +774,7 @@
           <a:p>
             <a:fld id="{0DC86ED9-B0FC-4166-96FE-019390E55704}" type="datetimeFigureOut">
               <a:rPr lang="en-US" smtClean="0"/>
-              <a:t>11/8/2021</a:t>
+              <a:t>12/8/2021</a:t>
             </a:fld>
             <a:endParaRPr lang="en-US"/>
           </a:p>
@@ -1018,7 +1018,7 @@
           <a:p>
             <a:fld id="{0DC86ED9-B0FC-4166-96FE-019390E55704}" type="datetimeFigureOut">
               <a:rPr lang="en-US" smtClean="0"/>
-              <a:t>11/8/2021</a:t>
+              <a:t>12/8/2021</a:t>
             </a:fld>
             <a:endParaRPr lang="en-US"/>
           </a:p>
@@ -1250,7 +1250,7 @@
           <a:p>
             <a:fld id="{0DC86ED9-B0FC-4166-96FE-019390E55704}" type="datetimeFigureOut">
               <a:rPr lang="en-US" smtClean="0"/>
-              <a:t>11/8/2021</a:t>
+              <a:t>12/8/2021</a:t>
             </a:fld>
             <a:endParaRPr lang="en-US"/>
           </a:p>
@@ -1617,7 +1617,7 @@
           <a:p>
             <a:fld id="{0DC86ED9-B0FC-4166-96FE-019390E55704}" type="datetimeFigureOut">
               <a:rPr lang="en-US" smtClean="0"/>
-              <a:t>11/8/2021</a:t>
+              <a:t>12/8/2021</a:t>
             </a:fld>
             <a:endParaRPr lang="en-US"/>
           </a:p>
@@ -1735,7 +1735,7 @@
           <a:p>
             <a:fld id="{0DC86ED9-B0FC-4166-96FE-019390E55704}" type="datetimeFigureOut">
               <a:rPr lang="en-US" smtClean="0"/>
-              <a:t>11/8/2021</a:t>
+              <a:t>12/8/2021</a:t>
             </a:fld>
             <a:endParaRPr lang="en-US"/>
           </a:p>
@@ -1830,7 +1830,7 @@
           <a:p>
             <a:fld id="{0DC86ED9-B0FC-4166-96FE-019390E55704}" type="datetimeFigureOut">
               <a:rPr lang="en-US" smtClean="0"/>
-              <a:t>11/8/2021</a:t>
+              <a:t>12/8/2021</a:t>
             </a:fld>
             <a:endParaRPr lang="en-US"/>
           </a:p>
@@ -2107,7 +2107,7 @@
           <a:p>
             <a:fld id="{0DC86ED9-B0FC-4166-96FE-019390E55704}" type="datetimeFigureOut">
               <a:rPr lang="en-US" smtClean="0"/>
-              <a:t>11/8/2021</a:t>
+              <a:t>12/8/2021</a:t>
             </a:fld>
             <a:endParaRPr lang="en-US"/>
           </a:p>
@@ -2364,7 +2364,7 @@
           <a:p>
             <a:fld id="{0DC86ED9-B0FC-4166-96FE-019390E55704}" type="datetimeFigureOut">
               <a:rPr lang="en-US" smtClean="0"/>
-              <a:t>11/8/2021</a:t>
+              <a:t>12/8/2021</a:t>
             </a:fld>
             <a:endParaRPr lang="en-US"/>
           </a:p>
@@ -2577,7 +2577,7 @@
           <a:p>
             <a:fld id="{0DC86ED9-B0FC-4166-96FE-019390E55704}" type="datetimeFigureOut">
               <a:rPr lang="en-US" smtClean="0"/>
-              <a:t>11/8/2021</a:t>
+              <a:t>12/8/2021</a:t>
             </a:fld>
             <a:endParaRPr lang="en-US"/>
           </a:p>
@@ -3182,7 +3182,7 @@
                 </a:solidFill>
                 <a:latin typeface="Arial" panose="020B0604020202020204" pitchFamily="34" charset="0"/>
               </a:rPr>
-              <a:t>Python 3.6+ venv</a:t>
+              <a:t>Python 3.7+ venv</a:t>
             </a:r>
           </a:p>
         </p:txBody>

</xml_diff>

<commit_message>
Updated the GitHub workflow picture to mention Python 3.7 instead of 3.6. Updated the NeurIPS paper link to point to the official pre-proceedings. Also, added the slides to the talks directory. (#905)
</commit_message>
<xml_diff>
--- a/talks/repositories.pptx
+++ b/talks/repositories.pptx
@@ -254,7 +254,7 @@
           <a:p>
             <a:fld id="{0DC86ED9-B0FC-4166-96FE-019390E55704}" type="datetimeFigureOut">
               <a:rPr lang="en-US" smtClean="0"/>
-              <a:t>11/8/2021</a:t>
+              <a:t>12/8/2021</a:t>
             </a:fld>
             <a:endParaRPr lang="en-US"/>
           </a:p>
@@ -424,7 +424,7 @@
           <a:p>
             <a:fld id="{0DC86ED9-B0FC-4166-96FE-019390E55704}" type="datetimeFigureOut">
               <a:rPr lang="en-US" smtClean="0"/>
-              <a:t>11/8/2021</a:t>
+              <a:t>12/8/2021</a:t>
             </a:fld>
             <a:endParaRPr lang="en-US"/>
           </a:p>
@@ -604,7 +604,7 @@
           <a:p>
             <a:fld id="{0DC86ED9-B0FC-4166-96FE-019390E55704}" type="datetimeFigureOut">
               <a:rPr lang="en-US" smtClean="0"/>
-              <a:t>11/8/2021</a:t>
+              <a:t>12/8/2021</a:t>
             </a:fld>
             <a:endParaRPr lang="en-US"/>
           </a:p>
@@ -774,7 +774,7 @@
           <a:p>
             <a:fld id="{0DC86ED9-B0FC-4166-96FE-019390E55704}" type="datetimeFigureOut">
               <a:rPr lang="en-US" smtClean="0"/>
-              <a:t>11/8/2021</a:t>
+              <a:t>12/8/2021</a:t>
             </a:fld>
             <a:endParaRPr lang="en-US"/>
           </a:p>
@@ -1018,7 +1018,7 @@
           <a:p>
             <a:fld id="{0DC86ED9-B0FC-4166-96FE-019390E55704}" type="datetimeFigureOut">
               <a:rPr lang="en-US" smtClean="0"/>
-              <a:t>11/8/2021</a:t>
+              <a:t>12/8/2021</a:t>
             </a:fld>
             <a:endParaRPr lang="en-US"/>
           </a:p>
@@ -1250,7 +1250,7 @@
           <a:p>
             <a:fld id="{0DC86ED9-B0FC-4166-96FE-019390E55704}" type="datetimeFigureOut">
               <a:rPr lang="en-US" smtClean="0"/>
-              <a:t>11/8/2021</a:t>
+              <a:t>12/8/2021</a:t>
             </a:fld>
             <a:endParaRPr lang="en-US"/>
           </a:p>
@@ -1617,7 +1617,7 @@
           <a:p>
             <a:fld id="{0DC86ED9-B0FC-4166-96FE-019390E55704}" type="datetimeFigureOut">
               <a:rPr lang="en-US" smtClean="0"/>
-              <a:t>11/8/2021</a:t>
+              <a:t>12/8/2021</a:t>
             </a:fld>
             <a:endParaRPr lang="en-US"/>
           </a:p>
@@ -1735,7 +1735,7 @@
           <a:p>
             <a:fld id="{0DC86ED9-B0FC-4166-96FE-019390E55704}" type="datetimeFigureOut">
               <a:rPr lang="en-US" smtClean="0"/>
-              <a:t>11/8/2021</a:t>
+              <a:t>12/8/2021</a:t>
             </a:fld>
             <a:endParaRPr lang="en-US"/>
           </a:p>
@@ -1830,7 +1830,7 @@
           <a:p>
             <a:fld id="{0DC86ED9-B0FC-4166-96FE-019390E55704}" type="datetimeFigureOut">
               <a:rPr lang="en-US" smtClean="0"/>
-              <a:t>11/8/2021</a:t>
+              <a:t>12/8/2021</a:t>
             </a:fld>
             <a:endParaRPr lang="en-US"/>
           </a:p>
@@ -2107,7 +2107,7 @@
           <a:p>
             <a:fld id="{0DC86ED9-B0FC-4166-96FE-019390E55704}" type="datetimeFigureOut">
               <a:rPr lang="en-US" smtClean="0"/>
-              <a:t>11/8/2021</a:t>
+              <a:t>12/8/2021</a:t>
             </a:fld>
             <a:endParaRPr lang="en-US"/>
           </a:p>
@@ -2364,7 +2364,7 @@
           <a:p>
             <a:fld id="{0DC86ED9-B0FC-4166-96FE-019390E55704}" type="datetimeFigureOut">
               <a:rPr lang="en-US" smtClean="0"/>
-              <a:t>11/8/2021</a:t>
+              <a:t>12/8/2021</a:t>
             </a:fld>
             <a:endParaRPr lang="en-US"/>
           </a:p>
@@ -2577,7 +2577,7 @@
           <a:p>
             <a:fld id="{0DC86ED9-B0FC-4166-96FE-019390E55704}" type="datetimeFigureOut">
               <a:rPr lang="en-US" smtClean="0"/>
-              <a:t>11/8/2021</a:t>
+              <a:t>12/8/2021</a:t>
             </a:fld>
             <a:endParaRPr lang="en-US"/>
           </a:p>
@@ -3182,7 +3182,7 @@
                 </a:solidFill>
                 <a:latin typeface="Arial" panose="020B0604020202020204" pitchFamily="34" charset="0"/>
               </a:rPr>
-              <a:t>Python 3.6+ venv</a:t>
+              <a:t>Python 3.7+ venv</a:t>
             </a:r>
           </a:p>
         </p:txBody>

</xml_diff>

<commit_message>
Documentation improvements: showing more of RASL in readthedocs, and mentioning the "commit -s" option in repositories.png.
Signed-off-by: Martin Hirzel <hirzel@gmail.com>
</commit_message>
<xml_diff>
--- a/talks/repositories.pptx
+++ b/talks/repositories.pptx
@@ -254,7 +254,7 @@
           <a:p>
             <a:fld id="{0DC86ED9-B0FC-4166-96FE-019390E55704}" type="datetimeFigureOut">
               <a:rPr lang="en-US" smtClean="0"/>
-              <a:t>12/8/2021</a:t>
+              <a:t>7/15/2022</a:t>
             </a:fld>
             <a:endParaRPr lang="en-US"/>
           </a:p>
@@ -424,7 +424,7 @@
           <a:p>
             <a:fld id="{0DC86ED9-B0FC-4166-96FE-019390E55704}" type="datetimeFigureOut">
               <a:rPr lang="en-US" smtClean="0"/>
-              <a:t>12/8/2021</a:t>
+              <a:t>7/15/2022</a:t>
             </a:fld>
             <a:endParaRPr lang="en-US"/>
           </a:p>
@@ -604,7 +604,7 @@
           <a:p>
             <a:fld id="{0DC86ED9-B0FC-4166-96FE-019390E55704}" type="datetimeFigureOut">
               <a:rPr lang="en-US" smtClean="0"/>
-              <a:t>12/8/2021</a:t>
+              <a:t>7/15/2022</a:t>
             </a:fld>
             <a:endParaRPr lang="en-US"/>
           </a:p>
@@ -774,7 +774,7 @@
           <a:p>
             <a:fld id="{0DC86ED9-B0FC-4166-96FE-019390E55704}" type="datetimeFigureOut">
               <a:rPr lang="en-US" smtClean="0"/>
-              <a:t>12/8/2021</a:t>
+              <a:t>7/15/2022</a:t>
             </a:fld>
             <a:endParaRPr lang="en-US"/>
           </a:p>
@@ -1018,7 +1018,7 @@
           <a:p>
             <a:fld id="{0DC86ED9-B0FC-4166-96FE-019390E55704}" type="datetimeFigureOut">
               <a:rPr lang="en-US" smtClean="0"/>
-              <a:t>12/8/2021</a:t>
+              <a:t>7/15/2022</a:t>
             </a:fld>
             <a:endParaRPr lang="en-US"/>
           </a:p>
@@ -1250,7 +1250,7 @@
           <a:p>
             <a:fld id="{0DC86ED9-B0FC-4166-96FE-019390E55704}" type="datetimeFigureOut">
               <a:rPr lang="en-US" smtClean="0"/>
-              <a:t>12/8/2021</a:t>
+              <a:t>7/15/2022</a:t>
             </a:fld>
             <a:endParaRPr lang="en-US"/>
           </a:p>
@@ -1617,7 +1617,7 @@
           <a:p>
             <a:fld id="{0DC86ED9-B0FC-4166-96FE-019390E55704}" type="datetimeFigureOut">
               <a:rPr lang="en-US" smtClean="0"/>
-              <a:t>12/8/2021</a:t>
+              <a:t>7/15/2022</a:t>
             </a:fld>
             <a:endParaRPr lang="en-US"/>
           </a:p>
@@ -1735,7 +1735,7 @@
           <a:p>
             <a:fld id="{0DC86ED9-B0FC-4166-96FE-019390E55704}" type="datetimeFigureOut">
               <a:rPr lang="en-US" smtClean="0"/>
-              <a:t>12/8/2021</a:t>
+              <a:t>7/15/2022</a:t>
             </a:fld>
             <a:endParaRPr lang="en-US"/>
           </a:p>
@@ -1830,7 +1830,7 @@
           <a:p>
             <a:fld id="{0DC86ED9-B0FC-4166-96FE-019390E55704}" type="datetimeFigureOut">
               <a:rPr lang="en-US" smtClean="0"/>
-              <a:t>12/8/2021</a:t>
+              <a:t>7/15/2022</a:t>
             </a:fld>
             <a:endParaRPr lang="en-US"/>
           </a:p>
@@ -2107,7 +2107,7 @@
           <a:p>
             <a:fld id="{0DC86ED9-B0FC-4166-96FE-019390E55704}" type="datetimeFigureOut">
               <a:rPr lang="en-US" smtClean="0"/>
-              <a:t>12/8/2021</a:t>
+              <a:t>7/15/2022</a:t>
             </a:fld>
             <a:endParaRPr lang="en-US"/>
           </a:p>
@@ -2364,7 +2364,7 @@
           <a:p>
             <a:fld id="{0DC86ED9-B0FC-4166-96FE-019390E55704}" type="datetimeFigureOut">
               <a:rPr lang="en-US" smtClean="0"/>
-              <a:t>12/8/2021</a:t>
+              <a:t>7/15/2022</a:t>
             </a:fld>
             <a:endParaRPr lang="en-US"/>
           </a:p>
@@ -2577,7 +2577,7 @@
           <a:p>
             <a:fld id="{0DC86ED9-B0FC-4166-96FE-019390E55704}" type="datetimeFigureOut">
               <a:rPr lang="en-US" smtClean="0"/>
-              <a:t>12/8/2021</a:t>
+              <a:t>7/15/2022</a:t>
             </a:fld>
             <a:endParaRPr lang="en-US"/>
           </a:p>
@@ -4961,7 +4961,7 @@
         <p:spPr>
           <a:xfrm>
             <a:off x="4605512" y="4157842"/>
-            <a:ext cx="1415772" cy="923330"/>
+            <a:ext cx="1553630" cy="923330"/>
           </a:xfrm>
           <a:prstGeom prst="rect">
             <a:avLst/>
@@ -5008,7 +5008,7 @@
               <a:rPr lang="en-US" sz="800">
                 <a:latin typeface="Arial" panose="020B0604020202020204" pitchFamily="34" charset="0"/>
               </a:rPr>
-              <a:t>git commit –a –m </a:t>
+              <a:t>git commit –s –a –m </a:t>
             </a:r>
             <a:r>
               <a:rPr lang="en-US" sz="800" i="1">

</xml_diff>

<commit_message>
Documentation improvements: showing more of RASL in readthedocs, and mentioning the "commit -s" option in repositories.png. (#1126)
* Documentation improvements: showing more of RASL in readthedocs, and mentioning the "commit -s" option in repositories.png.

Signed-off-by: Martin Hirzel <hirzel@gmail.com>

* Relative import.

Signed-off-by: Martin Hirzel <hirzel@gmail.com>
</commit_message>
<xml_diff>
--- a/talks/repositories.pptx
+++ b/talks/repositories.pptx
@@ -254,7 +254,7 @@
           <a:p>
             <a:fld id="{0DC86ED9-B0FC-4166-96FE-019390E55704}" type="datetimeFigureOut">
               <a:rPr lang="en-US" smtClean="0"/>
-              <a:t>12/8/2021</a:t>
+              <a:t>7/15/2022</a:t>
             </a:fld>
             <a:endParaRPr lang="en-US"/>
           </a:p>
@@ -424,7 +424,7 @@
           <a:p>
             <a:fld id="{0DC86ED9-B0FC-4166-96FE-019390E55704}" type="datetimeFigureOut">
               <a:rPr lang="en-US" smtClean="0"/>
-              <a:t>12/8/2021</a:t>
+              <a:t>7/15/2022</a:t>
             </a:fld>
             <a:endParaRPr lang="en-US"/>
           </a:p>
@@ -604,7 +604,7 @@
           <a:p>
             <a:fld id="{0DC86ED9-B0FC-4166-96FE-019390E55704}" type="datetimeFigureOut">
               <a:rPr lang="en-US" smtClean="0"/>
-              <a:t>12/8/2021</a:t>
+              <a:t>7/15/2022</a:t>
             </a:fld>
             <a:endParaRPr lang="en-US"/>
           </a:p>
@@ -774,7 +774,7 @@
           <a:p>
             <a:fld id="{0DC86ED9-B0FC-4166-96FE-019390E55704}" type="datetimeFigureOut">
               <a:rPr lang="en-US" smtClean="0"/>
-              <a:t>12/8/2021</a:t>
+              <a:t>7/15/2022</a:t>
             </a:fld>
             <a:endParaRPr lang="en-US"/>
           </a:p>
@@ -1018,7 +1018,7 @@
           <a:p>
             <a:fld id="{0DC86ED9-B0FC-4166-96FE-019390E55704}" type="datetimeFigureOut">
               <a:rPr lang="en-US" smtClean="0"/>
-              <a:t>12/8/2021</a:t>
+              <a:t>7/15/2022</a:t>
             </a:fld>
             <a:endParaRPr lang="en-US"/>
           </a:p>
@@ -1250,7 +1250,7 @@
           <a:p>
             <a:fld id="{0DC86ED9-B0FC-4166-96FE-019390E55704}" type="datetimeFigureOut">
               <a:rPr lang="en-US" smtClean="0"/>
-              <a:t>12/8/2021</a:t>
+              <a:t>7/15/2022</a:t>
             </a:fld>
             <a:endParaRPr lang="en-US"/>
           </a:p>
@@ -1617,7 +1617,7 @@
           <a:p>
             <a:fld id="{0DC86ED9-B0FC-4166-96FE-019390E55704}" type="datetimeFigureOut">
               <a:rPr lang="en-US" smtClean="0"/>
-              <a:t>12/8/2021</a:t>
+              <a:t>7/15/2022</a:t>
             </a:fld>
             <a:endParaRPr lang="en-US"/>
           </a:p>
@@ -1735,7 +1735,7 @@
           <a:p>
             <a:fld id="{0DC86ED9-B0FC-4166-96FE-019390E55704}" type="datetimeFigureOut">
               <a:rPr lang="en-US" smtClean="0"/>
-              <a:t>12/8/2021</a:t>
+              <a:t>7/15/2022</a:t>
             </a:fld>
             <a:endParaRPr lang="en-US"/>
           </a:p>
@@ -1830,7 +1830,7 @@
           <a:p>
             <a:fld id="{0DC86ED9-B0FC-4166-96FE-019390E55704}" type="datetimeFigureOut">
               <a:rPr lang="en-US" smtClean="0"/>
-              <a:t>12/8/2021</a:t>
+              <a:t>7/15/2022</a:t>
             </a:fld>
             <a:endParaRPr lang="en-US"/>
           </a:p>
@@ -2107,7 +2107,7 @@
           <a:p>
             <a:fld id="{0DC86ED9-B0FC-4166-96FE-019390E55704}" type="datetimeFigureOut">
               <a:rPr lang="en-US" smtClean="0"/>
-              <a:t>12/8/2021</a:t>
+              <a:t>7/15/2022</a:t>
             </a:fld>
             <a:endParaRPr lang="en-US"/>
           </a:p>
@@ -2364,7 +2364,7 @@
           <a:p>
             <a:fld id="{0DC86ED9-B0FC-4166-96FE-019390E55704}" type="datetimeFigureOut">
               <a:rPr lang="en-US" smtClean="0"/>
-              <a:t>12/8/2021</a:t>
+              <a:t>7/15/2022</a:t>
             </a:fld>
             <a:endParaRPr lang="en-US"/>
           </a:p>
@@ -2577,7 +2577,7 @@
           <a:p>
             <a:fld id="{0DC86ED9-B0FC-4166-96FE-019390E55704}" type="datetimeFigureOut">
               <a:rPr lang="en-US" smtClean="0"/>
-              <a:t>12/8/2021</a:t>
+              <a:t>7/15/2022</a:t>
             </a:fld>
             <a:endParaRPr lang="en-US"/>
           </a:p>
@@ -4961,7 +4961,7 @@
         <p:spPr>
           <a:xfrm>
             <a:off x="4605512" y="4157842"/>
-            <a:ext cx="1415772" cy="923330"/>
+            <a:ext cx="1553630" cy="923330"/>
           </a:xfrm>
           <a:prstGeom prst="rect">
             <a:avLst/>
@@ -5008,7 +5008,7 @@
               <a:rPr lang="en-US" sz="800">
                 <a:latin typeface="Arial" panose="020B0604020202020204" pitchFamily="34" charset="0"/>
               </a:rPr>
-              <a:t>git commit –a –m </a:t>
+              <a:t>git commit –s –a –m </a:t>
             </a:r>
             <a:r>
               <a:rPr lang="en-US" sz="800" i="1">

</xml_diff>